<commit_message>
Some changes to presentation
</commit_message>
<xml_diff>
--- a/Vital Statistics of Pro Athletes.pptx
+++ b/Vital Statistics of Pro Athletes.pptx
@@ -2,22 +2,24 @@
 <file path=ppt/presentation.xml><?xml version="1.0" encoding="utf-8"?>
 <p:presentation xmlns:a="http://schemas.openxmlformats.org/drawingml/2006/main" xmlns:r="http://schemas.openxmlformats.org/officeDocument/2006/relationships" xmlns:p="http://schemas.openxmlformats.org/presentationml/2006/main" autoCompressPictures="0">
   <p:sldMasterIdLst>
-    <p:sldMasterId id="2147483648" r:id="rId1"/>
+    <p:sldMasterId id="2147483668" r:id="rId1"/>
   </p:sldMasterIdLst>
   <p:sldIdLst>
     <p:sldId id="256" r:id="rId2"/>
     <p:sldId id="257" r:id="rId3"/>
-    <p:sldId id="258" r:id="rId4"/>
-    <p:sldId id="259" r:id="rId5"/>
-    <p:sldId id="260" r:id="rId6"/>
-    <p:sldId id="264" r:id="rId7"/>
-    <p:sldId id="261" r:id="rId8"/>
-    <p:sldId id="262" r:id="rId9"/>
-    <p:sldId id="265" r:id="rId10"/>
-    <p:sldId id="263" r:id="rId11"/>
-    <p:sldId id="266" r:id="rId12"/>
-    <p:sldId id="267" r:id="rId13"/>
-    <p:sldId id="268" r:id="rId14"/>
+    <p:sldId id="269" r:id="rId4"/>
+    <p:sldId id="258" r:id="rId5"/>
+    <p:sldId id="259" r:id="rId6"/>
+    <p:sldId id="260" r:id="rId7"/>
+    <p:sldId id="264" r:id="rId8"/>
+    <p:sldId id="261" r:id="rId9"/>
+    <p:sldId id="262" r:id="rId10"/>
+    <p:sldId id="265" r:id="rId11"/>
+    <p:sldId id="263" r:id="rId12"/>
+    <p:sldId id="266" r:id="rId13"/>
+    <p:sldId id="267" r:id="rId14"/>
+    <p:sldId id="268" r:id="rId15"/>
+    <p:sldId id="270" r:id="rId16"/>
   </p:sldIdLst>
   <p:sldSz cx="12192000" cy="6858000"/>
   <p:notesSz cx="6858000" cy="9144000"/>
@@ -116,6 +118,11 @@
       </a:defRPr>
     </a:lvl9pPr>
   </p:defaultTextStyle>
+  <p:extLst>
+    <p:ext uri="{EFAFB233-063F-42B5-8137-9DF3F51BA10A}">
+      <p15:sldGuideLst xmlns:p15="http://schemas.microsoft.com/office/powerpoint/2012/main"/>
+    </p:ext>
+  </p:extLst>
 </p:presentation>
 </file>
 
@@ -138,7 +145,7 @@
       </p:grpSpPr>
       <p:grpSp>
         <p:nvGrpSpPr>
-          <p:cNvPr id="7" name="Group 6"/>
+          <p:cNvPr id="16" name="Group 15"/>
           <p:cNvGrpSpPr/>
           <p:nvPr/>
         </p:nvGrpSpPr>
@@ -150,9 +157,72 @@
             <a:chExt cx="12192000" cy="6866467"/>
           </a:xfrm>
         </p:grpSpPr>
+        <p:sp>
+          <p:nvSpPr>
+            <p:cNvPr id="15" name="Freeform 14"/>
+            <p:cNvSpPr/>
+            <p:nvPr/>
+          </p:nvSpPr>
+          <p:spPr>
+            <a:xfrm>
+              <a:off x="0" y="-7862"/>
+              <a:ext cx="863600" cy="5698067"/>
+            </a:xfrm>
+            <a:custGeom>
+              <a:avLst/>
+              <a:gdLst/>
+              <a:ahLst/>
+              <a:cxnLst/>
+              <a:rect l="l" t="t" r="r" b="b"/>
+              <a:pathLst>
+                <a:path w="863600" h="5698067">
+                  <a:moveTo>
+                    <a:pt x="0" y="8467"/>
+                  </a:moveTo>
+                  <a:lnTo>
+                    <a:pt x="863600" y="0"/>
+                  </a:lnTo>
+                  <a:lnTo>
+                    <a:pt x="863600" y="16934"/>
+                  </a:lnTo>
+                  <a:lnTo>
+                    <a:pt x="0" y="5698067"/>
+                  </a:lnTo>
+                  <a:lnTo>
+                    <a:pt x="0" y="8467"/>
+                  </a:lnTo>
+                  <a:close/>
+                </a:path>
+              </a:pathLst>
+            </a:custGeom>
+            <a:solidFill>
+              <a:schemeClr val="accent1">
+                <a:alpha val="70000"/>
+              </a:schemeClr>
+            </a:solidFill>
+            <a:ln>
+              <a:noFill/>
+            </a:ln>
+            <a:effectLst/>
+          </p:spPr>
+          <p:style>
+            <a:lnRef idx="1">
+              <a:schemeClr val="accent1"/>
+            </a:lnRef>
+            <a:fillRef idx="3">
+              <a:schemeClr val="accent1"/>
+            </a:fillRef>
+            <a:effectRef idx="2">
+              <a:schemeClr val="accent1"/>
+            </a:effectRef>
+            <a:fontRef idx="minor">
+              <a:schemeClr val="lt1"/>
+            </a:fontRef>
+          </p:style>
+        </p:sp>
         <p:cxnSp>
           <p:nvCxnSpPr>
-            <p:cNvPr id="32" name="Straight Connector 31"/>
+            <p:cNvPr id="19" name="Straight Connector 18"/>
             <p:cNvCxnSpPr/>
             <p:nvPr/>
           </p:nvCxnSpPr>
@@ -166,8 +236,8 @@
             </a:prstGeom>
             <a:ln w="9525">
               <a:solidFill>
-                <a:schemeClr val="bg1">
-                  <a:lumMod val="75000"/>
+                <a:schemeClr val="accent1">
+                  <a:alpha val="70000"/>
                 </a:schemeClr>
               </a:solidFill>
             </a:ln>
@@ -189,7 +259,7 @@
         </p:cxnSp>
         <p:cxnSp>
           <p:nvCxnSpPr>
-            <p:cNvPr id="21" name="Straight Connector 20"/>
+            <p:cNvPr id="20" name="Straight Connector 19"/>
             <p:cNvCxnSpPr/>
             <p:nvPr/>
           </p:nvCxnSpPr>
@@ -203,8 +273,8 @@
             </a:prstGeom>
             <a:ln w="9525">
               <a:solidFill>
-                <a:schemeClr val="bg1">
-                  <a:lumMod val="85000"/>
+                <a:schemeClr val="accent1">
+                  <a:alpha val="70000"/>
                 </a:schemeClr>
               </a:solidFill>
             </a:ln>
@@ -226,7 +296,7 @@
         </p:cxnSp>
         <p:sp>
           <p:nvSpPr>
-            <p:cNvPr id="24" name="Rectangle 23"/>
+            <p:cNvPr id="21" name="Rectangle 23"/>
             <p:cNvSpPr/>
             <p:nvPr/>
           </p:nvSpPr>
@@ -264,7 +334,7 @@
             </a:custGeom>
             <a:solidFill>
               <a:schemeClr val="accent1">
-                <a:alpha val="30000"/>
+                <a:alpha val="36000"/>
               </a:schemeClr>
             </a:solidFill>
             <a:ln>
@@ -289,7 +359,7 @@
         </p:sp>
         <p:sp>
           <p:nvSpPr>
-            <p:cNvPr id="26" name="Rectangle 25"/>
+            <p:cNvPr id="22" name="Rectangle 25"/>
             <p:cNvSpPr/>
             <p:nvPr/>
           </p:nvSpPr>
@@ -352,7 +422,7 @@
         </p:sp>
         <p:sp>
           <p:nvSpPr>
-            <p:cNvPr id="27" name="Isosceles Triangle 26"/>
+            <p:cNvPr id="23" name="Isosceles Triangle 22"/>
             <p:cNvSpPr/>
             <p:nvPr/>
           </p:nvSpPr>
@@ -367,8 +437,9 @@
               </a:avLst>
             </a:prstGeom>
             <a:solidFill>
-              <a:schemeClr val="accent2">
-                <a:alpha val="72000"/>
+              <a:schemeClr val="accent1">
+                <a:lumMod val="75000"/>
+                <a:alpha val="66000"/>
               </a:schemeClr>
             </a:solidFill>
             <a:ln>
@@ -393,7 +464,7 @@
         </p:sp>
         <p:sp>
           <p:nvSpPr>
-            <p:cNvPr id="28" name="Rectangle 27"/>
+            <p:cNvPr id="24" name="Rectangle 27"/>
             <p:cNvSpPr/>
             <p:nvPr/>
           </p:nvSpPr>
@@ -430,9 +501,9 @@
               </a:pathLst>
             </a:custGeom>
             <a:solidFill>
-              <a:schemeClr val="accent2">
+              <a:schemeClr val="accent1">
                 <a:lumMod val="75000"/>
-                <a:alpha val="70000"/>
+                <a:alpha val="50000"/>
               </a:schemeClr>
             </a:solidFill>
             <a:ln>
@@ -457,7 +528,7 @@
         </p:sp>
         <p:sp>
           <p:nvSpPr>
-            <p:cNvPr id="29" name="Rectangle 28"/>
+            <p:cNvPr id="25" name="Rectangle 28"/>
             <p:cNvSpPr/>
             <p:nvPr/>
           </p:nvSpPr>
@@ -494,9 +565,7 @@
               </a:pathLst>
             </a:custGeom>
             <a:solidFill>
-              <a:schemeClr val="accent1">
-                <a:lumMod val="60000"/>
-                <a:lumOff val="40000"/>
+              <a:schemeClr val="accent2">
                 <a:alpha val="70000"/>
               </a:schemeClr>
             </a:solidFill>
@@ -522,7 +591,7 @@
         </p:sp>
         <p:sp>
           <p:nvSpPr>
-            <p:cNvPr id="30" name="Rectangle 29"/>
+            <p:cNvPr id="26" name="Rectangle 29"/>
             <p:cNvSpPr/>
             <p:nvPr/>
           </p:nvSpPr>
@@ -559,48 +628,8 @@
               </a:pathLst>
             </a:custGeom>
             <a:solidFill>
-              <a:schemeClr val="accent1">
-                <a:alpha val="65000"/>
-              </a:schemeClr>
-            </a:solidFill>
-            <a:ln>
-              <a:noFill/>
-            </a:ln>
-            <a:effectLst/>
-          </p:spPr>
-          <p:style>
-            <a:lnRef idx="1">
-              <a:schemeClr val="accent1"/>
-            </a:lnRef>
-            <a:fillRef idx="3">
-              <a:schemeClr val="accent1"/>
-            </a:fillRef>
-            <a:effectRef idx="2">
-              <a:schemeClr val="accent1"/>
-            </a:effectRef>
-            <a:fontRef idx="minor">
-              <a:schemeClr val="lt1"/>
-            </a:fontRef>
-          </p:style>
-        </p:sp>
-        <p:sp>
-          <p:nvSpPr>
-            <p:cNvPr id="31" name="Isosceles Triangle 30"/>
-            <p:cNvSpPr/>
-            <p:nvPr/>
-          </p:nvSpPr>
-          <p:spPr>
-            <a:xfrm>
-              <a:off x="10371666" y="3589867"/>
-              <a:ext cx="1817159" cy="3268133"/>
-            </a:xfrm>
-            <a:prstGeom prst="triangle">
-              <a:avLst>
-                <a:gd name="adj" fmla="val 100000"/>
-              </a:avLst>
-            </a:prstGeom>
-            <a:solidFill>
-              <a:schemeClr val="accent1">
+              <a:schemeClr val="accent2">
+                <a:lumMod val="75000"/>
                 <a:alpha val="80000"/>
               </a:schemeClr>
             </a:solidFill>
@@ -626,14 +655,14 @@
         </p:sp>
         <p:sp>
           <p:nvSpPr>
-            <p:cNvPr id="19" name="Isosceles Triangle 18"/>
+            <p:cNvPr id="27" name="Isosceles Triangle 26"/>
             <p:cNvSpPr/>
             <p:nvPr/>
           </p:nvSpPr>
           <p:spPr>
-            <a:xfrm rot="10800000">
-              <a:off x="0" y="0"/>
-              <a:ext cx="842596" cy="5666154"/>
+            <a:xfrm>
+              <a:off x="10371666" y="3589867"/>
+              <a:ext cx="1817159" cy="3268133"/>
             </a:xfrm>
             <a:prstGeom prst="triangle">
               <a:avLst>
@@ -642,7 +671,8 @@
             </a:prstGeom>
             <a:solidFill>
               <a:schemeClr val="accent1">
-                <a:alpha val="85000"/>
+                <a:lumMod val="75000"/>
+                <a:alpha val="66000"/>
               </a:schemeClr>
             </a:solidFill>
             <a:ln>
@@ -840,9 +870,9 @@
           <a:lstStyle/>
           <a:p>
             <a:fld id="{B61BEF0D-F0BB-DE4B-95CE-6DB70DBA9567}" type="datetimeFigureOut">
-              <a:rPr lang="en-US" dirty="0"/>
+              <a:rPr lang="en-US" smtClean="0"/>
               <a:pPr/>
-              <a:t>10/20/2018</a:t>
+              <a:t>10/24/2018</a:t>
             </a:fld>
             <a:endParaRPr lang="en-US" dirty="0"/>
           </a:p>
@@ -883,7 +913,7 @@
           <a:lstStyle/>
           <a:p>
             <a:fld id="{D57F1E4F-1CFF-5643-939E-217C01CDF565}" type="slidenum">
-              <a:rPr lang="en-US" dirty="0"/>
+              <a:rPr lang="en-US" smtClean="0"/>
               <a:pPr/>
               <a:t>‹#›</a:t>
             </a:fld>
@@ -892,6 +922,11 @@
         </p:txBody>
       </p:sp>
     </p:spTree>
+    <p:extLst>
+      <p:ext uri="{BB962C8B-B14F-4D97-AF65-F5344CB8AC3E}">
+        <p14:creationId xmlns:p14="http://schemas.microsoft.com/office/powerpoint/2010/main" val="1120249671"/>
+      </p:ext>
+    </p:extLst>
   </p:cSld>
   <p:clrMapOvr>
     <a:masterClrMapping/>
@@ -1088,9 +1123,9 @@
           <a:lstStyle/>
           <a:p>
             <a:fld id="{B61BEF0D-F0BB-DE4B-95CE-6DB70DBA9567}" type="datetimeFigureOut">
-              <a:rPr lang="en-US" dirty="0"/>
+              <a:rPr lang="en-US" smtClean="0"/>
               <a:pPr/>
-              <a:t>10/20/2018</a:t>
+              <a:t>10/24/2018</a:t>
             </a:fld>
             <a:endParaRPr lang="en-US" dirty="0"/>
           </a:p>
@@ -1131,7 +1166,7 @@
           <a:lstStyle/>
           <a:p>
             <a:fld id="{D57F1E4F-1CFF-5643-939E-217C01CDF565}" type="slidenum">
-              <a:rPr lang="en-US" dirty="0"/>
+              <a:rPr lang="en-US" smtClean="0"/>
               <a:pPr/>
               <a:t>‹#›</a:t>
             </a:fld>
@@ -1140,6 +1175,11 @@
         </p:txBody>
       </p:sp>
     </p:spTree>
+    <p:extLst>
+      <p:ext uri="{BB962C8B-B14F-4D97-AF65-F5344CB8AC3E}">
+        <p14:creationId xmlns:p14="http://schemas.microsoft.com/office/powerpoint/2010/main" val="1886390349"/>
+      </p:ext>
+    </p:extLst>
   </p:cSld>
   <p:clrMapOvr>
     <a:masterClrMapping/>
@@ -1399,9 +1439,9 @@
           <a:lstStyle/>
           <a:p>
             <a:fld id="{B61BEF0D-F0BB-DE4B-95CE-6DB70DBA9567}" type="datetimeFigureOut">
-              <a:rPr lang="en-US" dirty="0"/>
+              <a:rPr lang="en-US" smtClean="0"/>
               <a:pPr/>
-              <a:t>10/20/2018</a:t>
+              <a:t>10/24/2018</a:t>
             </a:fld>
             <a:endParaRPr lang="en-US" dirty="0"/>
           </a:p>
@@ -1442,7 +1482,7 @@
           <a:lstStyle/>
           <a:p>
             <a:fld id="{D57F1E4F-1CFF-5643-939E-217C01CDF565}" type="slidenum">
-              <a:rPr lang="en-US" dirty="0"/>
+              <a:rPr lang="en-US" smtClean="0"/>
               <a:pPr/>
               <a:t>‹#›</a:t>
             </a:fld>
@@ -1452,7 +1492,7 @@
       </p:sp>
       <p:sp>
         <p:nvSpPr>
-          <p:cNvPr id="20" name="TextBox 19"/>
+          <p:cNvPr id="24" name="TextBox 23"/>
           <p:cNvSpPr txBox="1"/>
           <p:nvPr/>
         </p:nvSpPr>
@@ -1493,7 +1533,7 @@
       </p:sp>
       <p:sp>
         <p:nvSpPr>
-          <p:cNvPr id="22" name="TextBox 21"/>
+          <p:cNvPr id="25" name="TextBox 24"/>
           <p:cNvSpPr txBox="1"/>
           <p:nvPr/>
         </p:nvSpPr>
@@ -1524,23 +1564,20 @@
                     <a:lumOff val="40000"/>
                   </a:schemeClr>
                 </a:solidFill>
+                <a:effectLst/>
                 <a:latin typeface="Arial"/>
               </a:rPr>
               <a:t>”</a:t>
             </a:r>
-            <a:endParaRPr lang="en-US" dirty="0">
-              <a:solidFill>
-                <a:schemeClr val="accent1">
-                  <a:lumMod val="60000"/>
-                  <a:lumOff val="40000"/>
-                </a:schemeClr>
-              </a:solidFill>
-              <a:latin typeface="Arial"/>
-            </a:endParaRPr>
           </a:p>
         </p:txBody>
       </p:sp>
     </p:spTree>
+    <p:extLst>
+      <p:ext uri="{BB962C8B-B14F-4D97-AF65-F5344CB8AC3E}">
+        <p14:creationId xmlns:p14="http://schemas.microsoft.com/office/powerpoint/2010/main" val="1470701579"/>
+      </p:ext>
+    </p:extLst>
   </p:cSld>
   <p:clrMapOvr>
     <a:masterClrMapping/>
@@ -1737,9 +1774,9 @@
           <a:lstStyle/>
           <a:p>
             <a:fld id="{B61BEF0D-F0BB-DE4B-95CE-6DB70DBA9567}" type="datetimeFigureOut">
-              <a:rPr lang="en-US" dirty="0"/>
+              <a:rPr lang="en-US" smtClean="0"/>
               <a:pPr/>
-              <a:t>10/20/2018</a:t>
+              <a:t>10/24/2018</a:t>
             </a:fld>
             <a:endParaRPr lang="en-US" dirty="0"/>
           </a:p>
@@ -1780,7 +1817,7 @@
           <a:lstStyle/>
           <a:p>
             <a:fld id="{D57F1E4F-1CFF-5643-939E-217C01CDF565}" type="slidenum">
-              <a:rPr lang="en-US" dirty="0"/>
+              <a:rPr lang="en-US" smtClean="0"/>
               <a:pPr/>
               <a:t>‹#›</a:t>
             </a:fld>
@@ -1789,6 +1826,11 @@
         </p:txBody>
       </p:sp>
     </p:spTree>
+    <p:extLst>
+      <p:ext uri="{BB962C8B-B14F-4D97-AF65-F5344CB8AC3E}">
+        <p14:creationId xmlns:p14="http://schemas.microsoft.com/office/powerpoint/2010/main" val="990859840"/>
+      </p:ext>
+    </p:extLst>
   </p:cSld>
   <p:clrMapOvr>
     <a:masterClrMapping/>
@@ -2048,9 +2090,9 @@
           <a:lstStyle/>
           <a:p>
             <a:fld id="{B61BEF0D-F0BB-DE4B-95CE-6DB70DBA9567}" type="datetimeFigureOut">
-              <a:rPr lang="en-US" dirty="0"/>
+              <a:rPr lang="en-US" smtClean="0"/>
               <a:pPr/>
-              <a:t>10/20/2018</a:t>
+              <a:t>10/24/2018</a:t>
             </a:fld>
             <a:endParaRPr lang="en-US" dirty="0"/>
           </a:p>
@@ -2091,7 +2133,7 @@
           <a:lstStyle/>
           <a:p>
             <a:fld id="{D57F1E4F-1CFF-5643-939E-217C01CDF565}" type="slidenum">
-              <a:rPr lang="en-US" dirty="0"/>
+              <a:rPr lang="en-US" smtClean="0"/>
               <a:pPr/>
               <a:t>‹#›</a:t>
             </a:fld>
@@ -2182,6 +2224,11 @@
         </p:txBody>
       </p:sp>
     </p:spTree>
+    <p:extLst>
+      <p:ext uri="{BB962C8B-B14F-4D97-AF65-F5344CB8AC3E}">
+        <p14:creationId xmlns:p14="http://schemas.microsoft.com/office/powerpoint/2010/main" val="4029731249"/>
+      </p:ext>
+    </p:extLst>
   </p:cSld>
   <p:clrMapOvr>
     <a:masterClrMapping/>
@@ -2438,9 +2485,9 @@
           <a:lstStyle/>
           <a:p>
             <a:fld id="{B61BEF0D-F0BB-DE4B-95CE-6DB70DBA9567}" type="datetimeFigureOut">
-              <a:rPr lang="en-US" dirty="0"/>
+              <a:rPr lang="en-US" smtClean="0"/>
               <a:pPr/>
-              <a:t>10/20/2018</a:t>
+              <a:t>10/24/2018</a:t>
             </a:fld>
             <a:endParaRPr lang="en-US" dirty="0"/>
           </a:p>
@@ -2481,7 +2528,7 @@
           <a:lstStyle/>
           <a:p>
             <a:fld id="{D57F1E4F-1CFF-5643-939E-217C01CDF565}" type="slidenum">
-              <a:rPr lang="en-US" dirty="0"/>
+              <a:rPr lang="en-US" smtClean="0"/>
               <a:pPr/>
               <a:t>‹#›</a:t>
             </a:fld>
@@ -2490,6 +2537,11 @@
         </p:txBody>
       </p:sp>
     </p:spTree>
+    <p:extLst>
+      <p:ext uri="{BB962C8B-B14F-4D97-AF65-F5344CB8AC3E}">
+        <p14:creationId xmlns:p14="http://schemas.microsoft.com/office/powerpoint/2010/main" val="2094248102"/>
+      </p:ext>
+    </p:extLst>
   </p:cSld>
   <p:clrMapOvr>
     <a:masterClrMapping/>
@@ -2605,8 +2657,8 @@
           <a:lstStyle/>
           <a:p>
             <a:fld id="{55C6B4A9-1611-4792-9094-5F34BCA07E0B}" type="datetimeFigureOut">
-              <a:rPr lang="en-US" dirty="0"/>
-              <a:t>10/20/2018</a:t>
+              <a:rPr lang="en-US" smtClean="0"/>
+              <a:t>10/24/2018</a:t>
             </a:fld>
             <a:endParaRPr lang="en-US" dirty="0"/>
           </a:p>
@@ -2647,7 +2699,7 @@
           <a:lstStyle/>
           <a:p>
             <a:fld id="{89333C77-0158-454C-844F-B7AB9BD7DAD4}" type="slidenum">
-              <a:rPr lang="en-US" dirty="0"/>
+              <a:rPr lang="en-US" smtClean="0"/>
               <a:t>‹#›</a:t>
             </a:fld>
             <a:endParaRPr lang="en-US" dirty="0"/>
@@ -2655,6 +2707,11 @@
         </p:txBody>
       </p:sp>
     </p:spTree>
+    <p:extLst>
+      <p:ext uri="{BB962C8B-B14F-4D97-AF65-F5344CB8AC3E}">
+        <p14:creationId xmlns:p14="http://schemas.microsoft.com/office/powerpoint/2010/main" val="791362806"/>
+      </p:ext>
+    </p:extLst>
   </p:cSld>
   <p:clrMapOvr>
     <a:masterClrMapping/>
@@ -2780,9 +2837,9 @@
           <a:lstStyle/>
           <a:p>
             <a:fld id="{B61BEF0D-F0BB-DE4B-95CE-6DB70DBA9567}" type="datetimeFigureOut">
-              <a:rPr lang="en-US" dirty="0"/>
+              <a:rPr lang="en-US" smtClean="0"/>
               <a:pPr/>
-              <a:t>10/20/2018</a:t>
+              <a:t>10/24/2018</a:t>
             </a:fld>
             <a:endParaRPr lang="en-US" dirty="0"/>
           </a:p>
@@ -2823,7 +2880,7 @@
           <a:lstStyle/>
           <a:p>
             <a:fld id="{D57F1E4F-1CFF-5643-939E-217C01CDF565}" type="slidenum">
-              <a:rPr lang="en-US" dirty="0"/>
+              <a:rPr lang="en-US" smtClean="0"/>
               <a:pPr/>
               <a:t>‹#›</a:t>
             </a:fld>
@@ -2832,6 +2889,11 @@
         </p:txBody>
       </p:sp>
     </p:spTree>
+    <p:extLst>
+      <p:ext uri="{BB962C8B-B14F-4D97-AF65-F5344CB8AC3E}">
+        <p14:creationId xmlns:p14="http://schemas.microsoft.com/office/powerpoint/2010/main" val="2020015130"/>
+      </p:ext>
+    </p:extLst>
   </p:cSld>
   <p:clrMapOvr>
     <a:masterClrMapping/>
@@ -2868,19 +2930,14 @@
         </p:nvSpPr>
         <p:spPr/>
         <p:txBody>
-          <a:bodyPr>
-            <a:normAutofit/>
-          </a:bodyPr>
-          <a:lstStyle>
-            <a:lvl1pPr>
-              <a:defRPr sz="3600"/>
-            </a:lvl1pPr>
-          </a:lstStyle>
-          <a:p>
-            <a:r>
-              <a:rPr lang="en-US" dirty="0"/>
+          <a:bodyPr/>
+          <a:lstStyle/>
+          <a:p>
+            <a:r>
+              <a:rPr lang="en-US"/>
               <a:t>Click to edit Master title style</a:t>
             </a:r>
+            <a:endParaRPr lang="en-US" dirty="0"/>
           </a:p>
         </p:txBody>
       </p:sp>
@@ -2901,37 +2958,38 @@
           <a:p>
             <a:pPr lvl="0"/>
             <a:r>
-              <a:rPr lang="en-US" dirty="0"/>
+              <a:rPr lang="en-US"/>
               <a:t>Edit Master text styles</a:t>
             </a:r>
           </a:p>
           <a:p>
             <a:pPr lvl="1"/>
             <a:r>
-              <a:rPr lang="en-US" dirty="0"/>
+              <a:rPr lang="en-US"/>
               <a:t>Second level</a:t>
             </a:r>
           </a:p>
           <a:p>
             <a:pPr lvl="2"/>
             <a:r>
-              <a:rPr lang="en-US" dirty="0"/>
+              <a:rPr lang="en-US"/>
               <a:t>Third level</a:t>
             </a:r>
           </a:p>
           <a:p>
             <a:pPr lvl="3"/>
             <a:r>
-              <a:rPr lang="en-US" dirty="0"/>
+              <a:rPr lang="en-US"/>
               <a:t>Fourth level</a:t>
             </a:r>
           </a:p>
           <a:p>
             <a:pPr lvl="4"/>
             <a:r>
-              <a:rPr lang="en-US" dirty="0"/>
+              <a:rPr lang="en-US"/>
               <a:t>Fifth level</a:t>
             </a:r>
+            <a:endParaRPr lang="en-US" dirty="0"/>
           </a:p>
         </p:txBody>
       </p:sp>
@@ -2951,9 +3009,9 @@
           <a:lstStyle/>
           <a:p>
             <a:fld id="{B61BEF0D-F0BB-DE4B-95CE-6DB70DBA9567}" type="datetimeFigureOut">
-              <a:rPr lang="en-US" dirty="0"/>
+              <a:rPr lang="en-US" smtClean="0"/>
               <a:pPr/>
-              <a:t>10/20/2018</a:t>
+              <a:t>10/24/2018</a:t>
             </a:fld>
             <a:endParaRPr lang="en-US" dirty="0"/>
           </a:p>
@@ -2994,7 +3052,7 @@
           <a:lstStyle/>
           <a:p>
             <a:fld id="{D57F1E4F-1CFF-5643-939E-217C01CDF565}" type="slidenum">
-              <a:rPr lang="en-US" dirty="0"/>
+              <a:rPr lang="en-US" smtClean="0"/>
               <a:pPr/>
               <a:t>‹#›</a:t>
             </a:fld>
@@ -3003,6 +3061,11 @@
         </p:txBody>
       </p:sp>
     </p:spTree>
+    <p:extLst>
+      <p:ext uri="{BB962C8B-B14F-4D97-AF65-F5344CB8AC3E}">
+        <p14:creationId xmlns:p14="http://schemas.microsoft.com/office/powerpoint/2010/main" val="3783173723"/>
+      </p:ext>
+    </p:extLst>
   </p:cSld>
   <p:clrMapOvr>
     <a:masterClrMapping/>
@@ -3195,9 +3258,9 @@
           <a:lstStyle/>
           <a:p>
             <a:fld id="{B61BEF0D-F0BB-DE4B-95CE-6DB70DBA9567}" type="datetimeFigureOut">
-              <a:rPr lang="en-US" dirty="0"/>
+              <a:rPr lang="en-US" smtClean="0"/>
               <a:pPr/>
-              <a:t>10/20/2018</a:t>
+              <a:t>10/24/2018</a:t>
             </a:fld>
             <a:endParaRPr lang="en-US" dirty="0"/>
           </a:p>
@@ -3238,7 +3301,7 @@
           <a:lstStyle/>
           <a:p>
             <a:fld id="{D57F1E4F-1CFF-5643-939E-217C01CDF565}" type="slidenum">
-              <a:rPr lang="en-US" dirty="0"/>
+              <a:rPr lang="en-US" smtClean="0"/>
               <a:pPr/>
               <a:t>‹#›</a:t>
             </a:fld>
@@ -3247,6 +3310,11 @@
         </p:txBody>
       </p:sp>
     </p:spTree>
+    <p:extLst>
+      <p:ext uri="{BB962C8B-B14F-4D97-AF65-F5344CB8AC3E}">
+        <p14:creationId xmlns:p14="http://schemas.microsoft.com/office/powerpoint/2010/main" val="2199620890"/>
+      </p:ext>
+    </p:extLst>
   </p:cSld>
   <p:clrMapOvr>
     <a:masterClrMapping/>
@@ -3424,8 +3492,8 @@
           <a:lstStyle/>
           <a:p>
             <a:fld id="{EB712588-04B1-427B-82EE-E8DB90309F08}" type="datetimeFigureOut">
-              <a:rPr lang="en-US" dirty="0"/>
-              <a:t>10/20/2018</a:t>
+              <a:rPr lang="en-US" smtClean="0"/>
+              <a:t>10/24/2018</a:t>
             </a:fld>
             <a:endParaRPr lang="en-US" dirty="0"/>
           </a:p>
@@ -3466,7 +3534,7 @@
           <a:lstStyle/>
           <a:p>
             <a:fld id="{6FF9F0C5-380F-41C2-899A-BAC0F0927E16}" type="slidenum">
-              <a:rPr lang="en-US" dirty="0"/>
+              <a:rPr lang="en-US" smtClean="0"/>
               <a:t>‹#›</a:t>
             </a:fld>
             <a:endParaRPr lang="en-US" dirty="0"/>
@@ -3474,6 +3542,11 @@
         </p:txBody>
       </p:sp>
     </p:spTree>
+    <p:extLst>
+      <p:ext uri="{BB962C8B-B14F-4D97-AF65-F5344CB8AC3E}">
+        <p14:creationId xmlns:p14="http://schemas.microsoft.com/office/powerpoint/2010/main" val="1838824070"/>
+      </p:ext>
+    </p:extLst>
   </p:cSld>
   <p:clrMapOvr>
     <a:masterClrMapping/>
@@ -3793,9 +3866,9 @@
           <a:lstStyle/>
           <a:p>
             <a:fld id="{B61BEF0D-F0BB-DE4B-95CE-6DB70DBA9567}" type="datetimeFigureOut">
-              <a:rPr lang="en-US" dirty="0"/>
+              <a:rPr lang="en-US" smtClean="0"/>
               <a:pPr/>
-              <a:t>10/20/2018</a:t>
+              <a:t>10/24/2018</a:t>
             </a:fld>
             <a:endParaRPr lang="en-US" dirty="0"/>
           </a:p>
@@ -3836,7 +3909,7 @@
           <a:lstStyle/>
           <a:p>
             <a:fld id="{D57F1E4F-1CFF-5643-939E-217C01CDF565}" type="slidenum">
-              <a:rPr lang="en-US" dirty="0"/>
+              <a:rPr lang="en-US" smtClean="0"/>
               <a:pPr/>
               <a:t>‹#›</a:t>
             </a:fld>
@@ -3845,6 +3918,11 @@
         </p:txBody>
       </p:sp>
     </p:spTree>
+    <p:extLst>
+      <p:ext uri="{BB962C8B-B14F-4D97-AF65-F5344CB8AC3E}">
+        <p14:creationId xmlns:p14="http://schemas.microsoft.com/office/powerpoint/2010/main" val="2123708794"/>
+      </p:ext>
+    </p:extLst>
   </p:cSld>
   <p:clrMapOvr>
     <a:masterClrMapping/>
@@ -3913,9 +3991,9 @@
           <a:lstStyle/>
           <a:p>
             <a:fld id="{B61BEF0D-F0BB-DE4B-95CE-6DB70DBA9567}" type="datetimeFigureOut">
-              <a:rPr lang="en-US" dirty="0"/>
+              <a:rPr lang="en-US" smtClean="0"/>
               <a:pPr/>
-              <a:t>10/20/2018</a:t>
+              <a:t>10/24/2018</a:t>
             </a:fld>
             <a:endParaRPr lang="en-US" dirty="0"/>
           </a:p>
@@ -3956,7 +4034,7 @@
           <a:lstStyle/>
           <a:p>
             <a:fld id="{D57F1E4F-1CFF-5643-939E-217C01CDF565}" type="slidenum">
-              <a:rPr lang="en-US" dirty="0"/>
+              <a:rPr lang="en-US" smtClean="0"/>
               <a:pPr/>
               <a:t>‹#›</a:t>
             </a:fld>
@@ -3965,6 +4043,11 @@
         </p:txBody>
       </p:sp>
     </p:spTree>
+    <p:extLst>
+      <p:ext uri="{BB962C8B-B14F-4D97-AF65-F5344CB8AC3E}">
+        <p14:creationId xmlns:p14="http://schemas.microsoft.com/office/powerpoint/2010/main" val="1328826035"/>
+      </p:ext>
+    </p:extLst>
   </p:cSld>
   <p:clrMapOvr>
     <a:masterClrMapping/>
@@ -4005,9 +4088,9 @@
           <a:lstStyle/>
           <a:p>
             <a:fld id="{B61BEF0D-F0BB-DE4B-95CE-6DB70DBA9567}" type="datetimeFigureOut">
-              <a:rPr lang="en-US" dirty="0"/>
+              <a:rPr lang="en-US" smtClean="0"/>
               <a:pPr/>
-              <a:t>10/20/2018</a:t>
+              <a:t>10/24/2018</a:t>
             </a:fld>
             <a:endParaRPr lang="en-US" dirty="0"/>
           </a:p>
@@ -4048,7 +4131,7 @@
           <a:lstStyle/>
           <a:p>
             <a:fld id="{D57F1E4F-1CFF-5643-939E-217C01CDF565}" type="slidenum">
-              <a:rPr lang="en-US" dirty="0"/>
+              <a:rPr lang="en-US" smtClean="0"/>
               <a:pPr/>
               <a:t>‹#›</a:t>
             </a:fld>
@@ -4057,6 +4140,11 @@
         </p:txBody>
       </p:sp>
     </p:spTree>
+    <p:extLst>
+      <p:ext uri="{BB962C8B-B14F-4D97-AF65-F5344CB8AC3E}">
+        <p14:creationId xmlns:p14="http://schemas.microsoft.com/office/powerpoint/2010/main" val="2369730018"/>
+      </p:ext>
+    </p:extLst>
   </p:cSld>
   <p:clrMapOvr>
     <a:masterClrMapping/>
@@ -4257,8 +4345,8 @@
           <a:lstStyle/>
           <a:p>
             <a:fld id="{42A54C80-263E-416B-A8E0-580EDEADCBDC}" type="datetimeFigureOut">
-              <a:rPr lang="en-US" dirty="0"/>
-              <a:t>10/20/2018</a:t>
+              <a:rPr lang="en-US" smtClean="0"/>
+              <a:t>10/24/2018</a:t>
             </a:fld>
             <a:endParaRPr lang="en-US" dirty="0"/>
           </a:p>
@@ -4299,7 +4387,7 @@
           <a:lstStyle/>
           <a:p>
             <a:fld id="{519954A3-9DFD-4C44-94BA-B95130A3BA1C}" type="slidenum">
-              <a:rPr lang="en-US" dirty="0"/>
+              <a:rPr lang="en-US" smtClean="0"/>
               <a:t>‹#›</a:t>
             </a:fld>
             <a:endParaRPr lang="en-US" dirty="0"/>
@@ -4307,6 +4395,11 @@
         </p:txBody>
       </p:sp>
     </p:spTree>
+    <p:extLst>
+      <p:ext uri="{BB962C8B-B14F-4D97-AF65-F5344CB8AC3E}">
+        <p14:creationId xmlns:p14="http://schemas.microsoft.com/office/powerpoint/2010/main" val="2740144495"/>
+      </p:ext>
+    </p:extLst>
   </p:cSld>
   <p:clrMapOvr>
     <a:masterClrMapping/>
@@ -4501,12 +4594,12 @@
       </p:sp>
       <p:sp>
         <p:nvSpPr>
-          <p:cNvPr id="5" name="Date Placeholder 4"/>
-          <p:cNvSpPr>
-            <a:spLocks noGrp="1"/>
-          </p:cNvSpPr>
-          <p:nvPr>
-            <p:ph type="dt" sz="half" idx="10"/>
+          <p:cNvPr id="6" name="Footer Placeholder 5"/>
+          <p:cNvSpPr>
+            <a:spLocks noGrp="1"/>
+          </p:cNvSpPr>
+          <p:nvPr>
+            <p:ph type="ftr" sz="quarter" idx="11"/>
           </p:nvPr>
         </p:nvSpPr>
         <p:spPr/>
@@ -4514,23 +4607,18 @@
           <a:bodyPr/>
           <a:lstStyle/>
           <a:p>
-            <a:fld id="{B61BEF0D-F0BB-DE4B-95CE-6DB70DBA9567}" type="datetimeFigureOut">
-              <a:rPr lang="en-US" dirty="0"/>
-              <a:pPr/>
-              <a:t>10/20/2018</a:t>
-            </a:fld>
-            <a:endParaRPr lang="en-US" dirty="0"/>
-          </a:p>
-        </p:txBody>
-      </p:sp>
-      <p:sp>
-        <p:nvSpPr>
-          <p:cNvPr id="6" name="Footer Placeholder 5"/>
-          <p:cNvSpPr>
-            <a:spLocks noGrp="1"/>
-          </p:cNvSpPr>
-          <p:nvPr>
-            <p:ph type="ftr" sz="quarter" idx="11"/>
+            <a:endParaRPr lang="en-US" dirty="0"/>
+          </a:p>
+        </p:txBody>
+      </p:sp>
+      <p:sp>
+        <p:nvSpPr>
+          <p:cNvPr id="7" name="Slide Number Placeholder 6"/>
+          <p:cNvSpPr>
+            <a:spLocks noGrp="1"/>
+          </p:cNvSpPr>
+          <p:nvPr>
+            <p:ph type="sldNum" sz="quarter" idx="12"/>
           </p:nvPr>
         </p:nvSpPr>
         <p:spPr/>
@@ -4538,27 +4626,8 @@
           <a:bodyPr/>
           <a:lstStyle/>
           <a:p>
-            <a:endParaRPr lang="en-US" dirty="0"/>
-          </a:p>
-        </p:txBody>
-      </p:sp>
-      <p:sp>
-        <p:nvSpPr>
-          <p:cNvPr id="7" name="Slide Number Placeholder 6"/>
-          <p:cNvSpPr>
-            <a:spLocks noGrp="1"/>
-          </p:cNvSpPr>
-          <p:nvPr>
-            <p:ph type="sldNum" sz="quarter" idx="12"/>
-          </p:nvPr>
-        </p:nvSpPr>
-        <p:spPr/>
-        <p:txBody>
-          <a:bodyPr/>
-          <a:lstStyle/>
-          <a:p>
             <a:fld id="{D57F1E4F-1CFF-5643-939E-217C01CDF565}" type="slidenum">
-              <a:rPr lang="en-US" dirty="0"/>
+              <a:rPr lang="en-US" smtClean="0"/>
               <a:pPr/>
               <a:t>‹#›</a:t>
             </a:fld>
@@ -4566,7 +4635,36 @@
           </a:p>
         </p:txBody>
       </p:sp>
+      <p:sp>
+        <p:nvSpPr>
+          <p:cNvPr id="5" name="Date Placeholder 4"/>
+          <p:cNvSpPr>
+            <a:spLocks noGrp="1"/>
+          </p:cNvSpPr>
+          <p:nvPr>
+            <p:ph type="dt" sz="half" idx="10"/>
+          </p:nvPr>
+        </p:nvSpPr>
+        <p:spPr/>
+        <p:txBody>
+          <a:bodyPr/>
+          <a:lstStyle/>
+          <a:p>
+            <a:fld id="{B61BEF0D-F0BB-DE4B-95CE-6DB70DBA9567}" type="datetimeFigureOut">
+              <a:rPr lang="en-US" smtClean="0"/>
+              <a:pPr/>
+              <a:t>10/24/2018</a:t>
+            </a:fld>
+            <a:endParaRPr lang="en-US" dirty="0"/>
+          </a:p>
+        </p:txBody>
+      </p:sp>
     </p:spTree>
+    <p:extLst>
+      <p:ext uri="{BB962C8B-B14F-4D97-AF65-F5344CB8AC3E}">
+        <p14:creationId xmlns:p14="http://schemas.microsoft.com/office/powerpoint/2010/main" val="3483320657"/>
+      </p:ext>
+    </p:extLst>
   </p:cSld>
   <p:clrMapOvr>
     <a:masterClrMapping/>
@@ -4598,7 +4696,7 @@
       </p:grpSpPr>
       <p:grpSp>
         <p:nvGrpSpPr>
-          <p:cNvPr id="7" name="Group 6"/>
+          <p:cNvPr id="44" name="Group 43"/>
           <p:cNvGrpSpPr/>
           <p:nvPr/>
         </p:nvGrpSpPr>
@@ -4626,8 +4724,8 @@
             </a:prstGeom>
             <a:ln w="9525">
               <a:solidFill>
-                <a:schemeClr val="bg1">
-                  <a:lumMod val="75000"/>
+                <a:schemeClr val="accent1">
+                  <a:alpha val="70000"/>
                 </a:schemeClr>
               </a:solidFill>
             </a:ln>
@@ -4663,8 +4761,8 @@
             </a:prstGeom>
             <a:ln w="9525">
               <a:solidFill>
-                <a:schemeClr val="bg1">
-                  <a:lumMod val="85000"/>
+                <a:schemeClr val="accent1">
+                  <a:alpha val="70000"/>
                 </a:schemeClr>
               </a:solidFill>
             </a:ln>
@@ -4724,7 +4822,7 @@
             </a:custGeom>
             <a:solidFill>
               <a:schemeClr val="accent1">
-                <a:alpha val="30000"/>
+                <a:alpha val="36000"/>
               </a:schemeClr>
             </a:solidFill>
             <a:ln>
@@ -4827,8 +4925,9 @@
               </a:avLst>
             </a:prstGeom>
             <a:solidFill>
-              <a:schemeClr val="accent2">
-                <a:alpha val="72000"/>
+              <a:schemeClr val="accent1">
+                <a:lumMod val="75000"/>
+                <a:alpha val="66000"/>
               </a:schemeClr>
             </a:solidFill>
             <a:ln>
@@ -4890,9 +4989,9 @@
               </a:pathLst>
             </a:custGeom>
             <a:solidFill>
-              <a:schemeClr val="accent2">
+              <a:schemeClr val="accent1">
                 <a:lumMod val="75000"/>
-                <a:alpha val="70000"/>
+                <a:alpha val="50000"/>
               </a:schemeClr>
             </a:solidFill>
             <a:ln>
@@ -4954,9 +5053,7 @@
               </a:pathLst>
             </a:custGeom>
             <a:solidFill>
-              <a:schemeClr val="accent1">
-                <a:lumMod val="60000"/>
-                <a:lumOff val="40000"/>
+              <a:schemeClr val="accent2">
                 <a:alpha val="70000"/>
               </a:schemeClr>
             </a:solidFill>
@@ -5019,8 +5116,9 @@
               </a:pathLst>
             </a:custGeom>
             <a:solidFill>
-              <a:schemeClr val="accent1">
-                <a:alpha val="65000"/>
+              <a:schemeClr val="accent2">
+                <a:lumMod val="75000"/>
+                <a:alpha val="80000"/>
               </a:schemeClr>
             </a:solidFill>
             <a:ln>
@@ -5061,7 +5159,8 @@
             </a:prstGeom>
             <a:solidFill>
               <a:schemeClr val="accent1">
-                <a:alpha val="80000"/>
+                <a:lumMod val="75000"/>
+                <a:alpha val="66000"/>
               </a:schemeClr>
             </a:solidFill>
             <a:ln>
@@ -5086,7 +5185,7 @@
         </p:sp>
         <p:sp>
           <p:nvSpPr>
-            <p:cNvPr id="29" name="Isosceles Triangle 28"/>
+            <p:cNvPr id="19" name="Isosceles Triangle 18"/>
             <p:cNvSpPr/>
             <p:nvPr/>
           </p:nvSpPr>
@@ -5102,7 +5201,7 @@
             </a:prstGeom>
             <a:solidFill>
               <a:schemeClr val="accent1">
-                <a:alpha val="85000"/>
+                <a:alpha val="70000"/>
               </a:schemeClr>
             </a:solidFill>
             <a:ln>
@@ -5255,9 +5354,9 @@
           </a:lstStyle>
           <a:p>
             <a:fld id="{B61BEF0D-F0BB-DE4B-95CE-6DB70DBA9567}" type="datetimeFigureOut">
-              <a:rPr lang="en-US" dirty="0"/>
+              <a:rPr lang="en-US" smtClean="0"/>
               <a:pPr/>
-              <a:t>10/20/2018</a:t>
+              <a:t>10/24/2018</a:t>
             </a:fld>
             <a:endParaRPr lang="en-US" dirty="0"/>
           </a:p>
@@ -5332,7 +5431,7 @@
           </a:lstStyle>
           <a:p>
             <a:fld id="{D57F1E4F-1CFF-5643-939E-217C01CDF565}" type="slidenum">
-              <a:rPr lang="en-US" dirty="0"/>
+              <a:rPr lang="en-US" smtClean="0"/>
               <a:pPr/>
               <a:t>‹#›</a:t>
             </a:fld>
@@ -5341,25 +5440,30 @@
         </p:txBody>
       </p:sp>
     </p:spTree>
+    <p:extLst>
+      <p:ext uri="{BB962C8B-B14F-4D97-AF65-F5344CB8AC3E}">
+        <p14:creationId xmlns:p14="http://schemas.microsoft.com/office/powerpoint/2010/main" val="4236420657"/>
+      </p:ext>
+    </p:extLst>
   </p:cSld>
   <p:clrMap bg1="lt1" tx1="dk1" bg2="lt2" tx2="dk2" accent1="accent1" accent2="accent2" accent3="accent3" accent4="accent4" accent5="accent5" accent6="accent6" hlink="hlink" folHlink="folHlink"/>
   <p:sldLayoutIdLst>
-    <p:sldLayoutId id="2147483649" r:id="rId1"/>
-    <p:sldLayoutId id="2147483650" r:id="rId2"/>
-    <p:sldLayoutId id="2147483651" r:id="rId3"/>
-    <p:sldLayoutId id="2147483665" r:id="rId4"/>
-    <p:sldLayoutId id="2147483653" r:id="rId5"/>
-    <p:sldLayoutId id="2147483654" r:id="rId6"/>
-    <p:sldLayoutId id="2147483655" r:id="rId7"/>
-    <p:sldLayoutId id="2147483666" r:id="rId8"/>
-    <p:sldLayoutId id="2147483657" r:id="rId9"/>
-    <p:sldLayoutId id="2147483660" r:id="rId10"/>
-    <p:sldLayoutId id="2147483661" r:id="rId11"/>
-    <p:sldLayoutId id="2147483662" r:id="rId12"/>
-    <p:sldLayoutId id="2147483663" r:id="rId13"/>
-    <p:sldLayoutId id="2147483664" r:id="rId14"/>
-    <p:sldLayoutId id="2147483667" r:id="rId15"/>
-    <p:sldLayoutId id="2147483659" r:id="rId16"/>
+    <p:sldLayoutId id="2147483669" r:id="rId1"/>
+    <p:sldLayoutId id="2147483670" r:id="rId2"/>
+    <p:sldLayoutId id="2147483671" r:id="rId3"/>
+    <p:sldLayoutId id="2147483672" r:id="rId4"/>
+    <p:sldLayoutId id="2147483673" r:id="rId5"/>
+    <p:sldLayoutId id="2147483674" r:id="rId6"/>
+    <p:sldLayoutId id="2147483675" r:id="rId7"/>
+    <p:sldLayoutId id="2147483676" r:id="rId8"/>
+    <p:sldLayoutId id="2147483677" r:id="rId9"/>
+    <p:sldLayoutId id="2147483678" r:id="rId10"/>
+    <p:sldLayoutId id="2147483679" r:id="rId11"/>
+    <p:sldLayoutId id="2147483680" r:id="rId12"/>
+    <p:sldLayoutId id="2147483681" r:id="rId13"/>
+    <p:sldLayoutId id="2147483682" r:id="rId14"/>
+    <p:sldLayoutId id="2147483683" r:id="rId15"/>
+    <p:sldLayoutId id="2147483684" r:id="rId16"/>
   </p:sldLayoutIdLst>
   <p:txStyles>
     <p:titleStyle>
@@ -5777,6 +5881,53 @@
           <a:chExt cx="0" cy="0"/>
         </a:xfrm>
       </p:grpSpPr>
+      <p:pic>
+        <p:nvPicPr>
+          <p:cNvPr id="2058" name="Picture 10" descr="Image result for hockey puck">
+            <a:extLst>
+              <a:ext uri="{FF2B5EF4-FFF2-40B4-BE49-F238E27FC236}">
+                <a16:creationId xmlns:a16="http://schemas.microsoft.com/office/drawing/2014/main" id="{24B31949-DBE7-4395-AA39-771026AA9789}"/>
+              </a:ext>
+            </a:extLst>
+          </p:cNvPr>
+          <p:cNvPicPr>
+            <a:picLocks noChangeAspect="1" noChangeArrowheads="1"/>
+          </p:cNvPicPr>
+          <p:nvPr/>
+        </p:nvPicPr>
+        <p:blipFill>
+          <a:blip r:embed="rId2">
+            <a:extLst>
+              <a:ext uri="{28A0092B-C50C-407E-A947-70E740481C1C}">
+                <a14:useLocalDpi xmlns:a14="http://schemas.microsoft.com/office/drawing/2010/main" val="0"/>
+              </a:ext>
+            </a:extLst>
+          </a:blip>
+          <a:srcRect/>
+          <a:stretch>
+            <a:fillRect/>
+          </a:stretch>
+        </p:blipFill>
+        <p:spPr bwMode="auto">
+          <a:xfrm>
+            <a:off x="7407970" y="5044383"/>
+            <a:ext cx="1813617" cy="1813617"/>
+          </a:xfrm>
+          <a:prstGeom prst="rect">
+            <a:avLst/>
+          </a:prstGeom>
+          <a:noFill/>
+          <a:extLst>
+            <a:ext uri="{909E8E84-426E-40DD-AFC4-6F175D3DCCD1}">
+              <a14:hiddenFill xmlns:a14="http://schemas.microsoft.com/office/drawing/2010/main">
+                <a:solidFill>
+                  <a:srgbClr val="FFFFFF"/>
+                </a:solidFill>
+              </a14:hiddenFill>
+            </a:ext>
+          </a:extLst>
+        </p:spPr>
+      </p:pic>
       <p:sp>
         <p:nvSpPr>
           <p:cNvPr id="2" name="Title 1">
@@ -5847,6 +5998,147 @@
           </a:p>
         </p:txBody>
       </p:sp>
+      <p:pic>
+        <p:nvPicPr>
+          <p:cNvPr id="2050" name="Picture 2" descr="Image result for baseball">
+            <a:extLst>
+              <a:ext uri="{FF2B5EF4-FFF2-40B4-BE49-F238E27FC236}">
+                <a16:creationId xmlns:a16="http://schemas.microsoft.com/office/drawing/2014/main" id="{D47B1B64-621C-431D-9730-752FDD6B5552}"/>
+              </a:ext>
+            </a:extLst>
+          </p:cNvPr>
+          <p:cNvPicPr>
+            <a:picLocks noChangeAspect="1" noChangeArrowheads="1"/>
+          </p:cNvPicPr>
+          <p:nvPr/>
+        </p:nvPicPr>
+        <p:blipFill>
+          <a:blip r:embed="rId3">
+            <a:extLst>
+              <a:ext uri="{28A0092B-C50C-407E-A947-70E740481C1C}">
+                <a14:useLocalDpi xmlns:a14="http://schemas.microsoft.com/office/drawing/2010/main" val="0"/>
+              </a:ext>
+            </a:extLst>
+          </a:blip>
+          <a:srcRect/>
+          <a:stretch>
+            <a:fillRect/>
+          </a:stretch>
+        </p:blipFill>
+        <p:spPr bwMode="auto">
+          <a:xfrm>
+            <a:off x="1280506" y="204096"/>
+            <a:ext cx="2171700" cy="2105025"/>
+          </a:xfrm>
+          <a:prstGeom prst="rect">
+            <a:avLst/>
+          </a:prstGeom>
+          <a:noFill/>
+          <a:extLst>
+            <a:ext uri="{909E8E84-426E-40DD-AFC4-6F175D3DCCD1}">
+              <a14:hiddenFill xmlns:a14="http://schemas.microsoft.com/office/drawing/2010/main">
+                <a:solidFill>
+                  <a:srgbClr val="FFFFFF"/>
+                </a:solidFill>
+              </a14:hiddenFill>
+            </a:ext>
+          </a:extLst>
+        </p:spPr>
+      </p:pic>
+      <p:pic>
+        <p:nvPicPr>
+          <p:cNvPr id="2052" name="Picture 4" descr="Image result for football">
+            <a:extLst>
+              <a:ext uri="{FF2B5EF4-FFF2-40B4-BE49-F238E27FC236}">
+                <a16:creationId xmlns:a16="http://schemas.microsoft.com/office/drawing/2014/main" id="{529BB13E-5421-4FA5-A0C7-0F981EEBDBCA}"/>
+              </a:ext>
+            </a:extLst>
+          </p:cNvPr>
+          <p:cNvPicPr>
+            <a:picLocks noChangeAspect="1" noChangeArrowheads="1"/>
+          </p:cNvPicPr>
+          <p:nvPr/>
+        </p:nvPicPr>
+        <p:blipFill>
+          <a:blip r:embed="rId4">
+            <a:extLst>
+              <a:ext uri="{28A0092B-C50C-407E-A947-70E740481C1C}">
+                <a14:useLocalDpi xmlns:a14="http://schemas.microsoft.com/office/drawing/2010/main" val="0"/>
+              </a:ext>
+            </a:extLst>
+          </a:blip>
+          <a:srcRect/>
+          <a:stretch>
+            <a:fillRect/>
+          </a:stretch>
+        </p:blipFill>
+        <p:spPr bwMode="auto">
+          <a:xfrm>
+            <a:off x="6714691" y="334675"/>
+            <a:ext cx="2143125" cy="2143125"/>
+          </a:xfrm>
+          <a:prstGeom prst="rect">
+            <a:avLst/>
+          </a:prstGeom>
+          <a:noFill/>
+          <a:extLst>
+            <a:ext uri="{909E8E84-426E-40DD-AFC4-6F175D3DCCD1}">
+              <a14:hiddenFill xmlns:a14="http://schemas.microsoft.com/office/drawing/2010/main">
+                <a:solidFill>
+                  <a:srgbClr val="FFFFFF"/>
+                </a:solidFill>
+              </a14:hiddenFill>
+            </a:ext>
+          </a:extLst>
+        </p:spPr>
+      </p:pic>
+      <p:pic>
+        <p:nvPicPr>
+          <p:cNvPr id="2054" name="Picture 6" descr="Image result for basketball">
+            <a:extLst>
+              <a:ext uri="{FF2B5EF4-FFF2-40B4-BE49-F238E27FC236}">
+                <a16:creationId xmlns:a16="http://schemas.microsoft.com/office/drawing/2014/main" id="{E66DF690-94E2-4BF0-AB3D-76B948F4F0A5}"/>
+              </a:ext>
+            </a:extLst>
+          </p:cNvPr>
+          <p:cNvPicPr>
+            <a:picLocks noChangeAspect="1" noChangeArrowheads="1"/>
+          </p:cNvPicPr>
+          <p:nvPr/>
+        </p:nvPicPr>
+        <p:blipFill>
+          <a:blip r:embed="rId5">
+            <a:extLst>
+              <a:ext uri="{28A0092B-C50C-407E-A947-70E740481C1C}">
+                <a14:useLocalDpi xmlns:a14="http://schemas.microsoft.com/office/drawing/2010/main" val="0"/>
+              </a:ext>
+            </a:extLst>
+          </a:blip>
+          <a:srcRect/>
+          <a:stretch>
+            <a:fillRect/>
+          </a:stretch>
+        </p:blipFill>
+        <p:spPr bwMode="auto">
+          <a:xfrm>
+            <a:off x="1193088" y="4233949"/>
+            <a:ext cx="2259117" cy="2259117"/>
+          </a:xfrm>
+          <a:prstGeom prst="rect">
+            <a:avLst/>
+          </a:prstGeom>
+          <a:noFill/>
+          <a:extLst>
+            <a:ext uri="{909E8E84-426E-40DD-AFC4-6F175D3DCCD1}">
+              <a14:hiddenFill xmlns:a14="http://schemas.microsoft.com/office/drawing/2010/main">
+                <a:solidFill>
+                  <a:srgbClr val="FFFFFF"/>
+                </a:solidFill>
+              </a14:hiddenFill>
+            </a:ext>
+          </a:extLst>
+        </p:spPr>
+      </p:pic>
     </p:spTree>
     <p:extLst>
       <p:ext uri="{BB962C8B-B14F-4D97-AF65-F5344CB8AC3E}">
@@ -5861,1255 +6153,6 @@
 </file>
 
 <file path=ppt/slides/slide10.xml><?xml version="1.0" encoding="utf-8"?>
-<p:sld xmlns:a="http://schemas.openxmlformats.org/drawingml/2006/main" xmlns:r="http://schemas.openxmlformats.org/officeDocument/2006/relationships" xmlns:p="http://schemas.openxmlformats.org/presentationml/2006/main">
-  <p:cSld>
-    <p:spTree>
-      <p:nvGrpSpPr>
-        <p:cNvPr id="1" name=""/>
-        <p:cNvGrpSpPr/>
-        <p:nvPr/>
-      </p:nvGrpSpPr>
-      <p:grpSpPr>
-        <a:xfrm>
-          <a:off x="0" y="0"/>
-          <a:ext cx="0" cy="0"/>
-          <a:chOff x="0" y="0"/>
-          <a:chExt cx="0" cy="0"/>
-        </a:xfrm>
-      </p:grpSpPr>
-      <p:sp>
-        <p:nvSpPr>
-          <p:cNvPr id="2" name="Title 1">
-            <a:extLst>
-              <a:ext uri="{FF2B5EF4-FFF2-40B4-BE49-F238E27FC236}">
-                <a16:creationId xmlns:a16="http://schemas.microsoft.com/office/drawing/2014/main" id="{1FA64C33-C1FD-42C1-8F71-0CFD8C41F557}"/>
-              </a:ext>
-            </a:extLst>
-          </p:cNvPr>
-          <p:cNvSpPr>
-            <a:spLocks noGrp="1"/>
-          </p:cNvSpPr>
-          <p:nvPr>
-            <p:ph type="title"/>
-          </p:nvPr>
-        </p:nvSpPr>
-        <p:spPr/>
-        <p:txBody>
-          <a:bodyPr/>
-          <a:lstStyle/>
-          <a:p>
-            <a:r>
-              <a:rPr lang="en-US" dirty="0"/>
-              <a:t>Comparison of Distributions of Ages at Death</a:t>
-            </a:r>
-          </a:p>
-        </p:txBody>
-      </p:sp>
-      <p:sp>
-        <p:nvSpPr>
-          <p:cNvPr id="3" name="Content Placeholder 2">
-            <a:extLst>
-              <a:ext uri="{FF2B5EF4-FFF2-40B4-BE49-F238E27FC236}">
-                <a16:creationId xmlns:a16="http://schemas.microsoft.com/office/drawing/2014/main" id="{A6E625F1-71B9-4828-B8B4-E19DB5FA8922}"/>
-              </a:ext>
-            </a:extLst>
-          </p:cNvPr>
-          <p:cNvSpPr>
-            <a:spLocks noGrp="1"/>
-          </p:cNvSpPr>
-          <p:nvPr>
-            <p:ph idx="1"/>
-          </p:nvPr>
-        </p:nvSpPr>
-        <p:spPr/>
-        <p:txBody>
-          <a:bodyPr/>
-          <a:lstStyle/>
-          <a:p>
-            <a:r>
-              <a:rPr lang="en-US" dirty="0"/>
-              <a:t>Conduct an A/B test between two population samples:</a:t>
-            </a:r>
-          </a:p>
-          <a:p>
-            <a:pPr lvl="1"/>
-            <a:r>
-              <a:rPr lang="en-US" dirty="0"/>
-              <a:t>First group: all athletes of a particular sport who died in a particular year</a:t>
-            </a:r>
-          </a:p>
-          <a:p>
-            <a:pPr lvl="1"/>
-            <a:r>
-              <a:rPr lang="en-US" dirty="0"/>
-              <a:t>Second group: general population of American males who died in a particular year</a:t>
-            </a:r>
-          </a:p>
-          <a:p>
-            <a:r>
-              <a:rPr lang="en-US" dirty="0"/>
-              <a:t>For NBA, NHL, and NFL athletes, A/B test did not reveal any conclusive differences between the athletes’ ages with those of the general population</a:t>
-            </a:r>
-          </a:p>
-          <a:p>
-            <a:pPr lvl="1"/>
-            <a:r>
-              <a:rPr lang="en-US" dirty="0"/>
-              <a:t>One exception: NHL player deaths in 2011</a:t>
-            </a:r>
-          </a:p>
-          <a:p>
-            <a:r>
-              <a:rPr lang="en-US" dirty="0"/>
-              <a:t>However, for Major League Baseball players, the A/B test revealed a difference between their age distribution and that of the general population</a:t>
-            </a:r>
-          </a:p>
-        </p:txBody>
-      </p:sp>
-    </p:spTree>
-    <p:extLst>
-      <p:ext uri="{BB962C8B-B14F-4D97-AF65-F5344CB8AC3E}">
-        <p14:creationId xmlns:p14="http://schemas.microsoft.com/office/powerpoint/2010/main" val="3808565248"/>
-      </p:ext>
-    </p:extLst>
-  </p:cSld>
-  <p:clrMapOvr>
-    <a:masterClrMapping/>
-  </p:clrMapOvr>
-</p:sld>
-</file>
-
-<file path=ppt/slides/slide11.xml><?xml version="1.0" encoding="utf-8"?>
-<p:sld xmlns:a="http://schemas.openxmlformats.org/drawingml/2006/main" xmlns:r="http://schemas.openxmlformats.org/officeDocument/2006/relationships" xmlns:p="http://schemas.openxmlformats.org/presentationml/2006/main">
-  <p:cSld>
-    <p:spTree>
-      <p:nvGrpSpPr>
-        <p:cNvPr id="1" name=""/>
-        <p:cNvGrpSpPr/>
-        <p:nvPr/>
-      </p:nvGrpSpPr>
-      <p:grpSpPr>
-        <a:xfrm>
-          <a:off x="0" y="0"/>
-          <a:ext cx="0" cy="0"/>
-          <a:chOff x="0" y="0"/>
-          <a:chExt cx="0" cy="0"/>
-        </a:xfrm>
-      </p:grpSpPr>
-      <p:sp>
-        <p:nvSpPr>
-          <p:cNvPr id="2" name="Title 1">
-            <a:extLst>
-              <a:ext uri="{FF2B5EF4-FFF2-40B4-BE49-F238E27FC236}">
-                <a16:creationId xmlns:a16="http://schemas.microsoft.com/office/drawing/2014/main" id="{A793354D-2898-42B4-8898-3AFE8A760F77}"/>
-              </a:ext>
-            </a:extLst>
-          </p:cNvPr>
-          <p:cNvSpPr>
-            <a:spLocks noGrp="1"/>
-          </p:cNvSpPr>
-          <p:nvPr>
-            <p:ph type="title"/>
-          </p:nvPr>
-        </p:nvSpPr>
-        <p:spPr/>
-        <p:txBody>
-          <a:bodyPr/>
-          <a:lstStyle/>
-          <a:p>
-            <a:r>
-              <a:rPr lang="en-US" dirty="0"/>
-              <a:t>Average Age at Death of Pro Athletes</a:t>
-            </a:r>
-          </a:p>
-        </p:txBody>
-      </p:sp>
-      <p:pic>
-        <p:nvPicPr>
-          <p:cNvPr id="5" name="Content Placeholder 4">
-            <a:extLst>
-              <a:ext uri="{FF2B5EF4-FFF2-40B4-BE49-F238E27FC236}">
-                <a16:creationId xmlns:a16="http://schemas.microsoft.com/office/drawing/2014/main" id="{3BCD4A6F-9DDF-45A2-ABF3-4EEE8E64D786}"/>
-              </a:ext>
-            </a:extLst>
-          </p:cNvPr>
-          <p:cNvPicPr>
-            <a:picLocks noGrp="1" noChangeAspect="1"/>
-          </p:cNvPicPr>
-          <p:nvPr>
-            <p:ph idx="1"/>
-          </p:nvPr>
-        </p:nvPicPr>
-        <p:blipFill>
-          <a:blip r:embed="rId2"/>
-          <a:stretch>
-            <a:fillRect/>
-          </a:stretch>
-        </p:blipFill>
-        <p:spPr>
-          <a:xfrm>
-            <a:off x="1158241" y="1636859"/>
-            <a:ext cx="8125326" cy="4307536"/>
-          </a:xfrm>
-        </p:spPr>
-      </p:pic>
-    </p:spTree>
-    <p:extLst>
-      <p:ext uri="{BB962C8B-B14F-4D97-AF65-F5344CB8AC3E}">
-        <p14:creationId xmlns:p14="http://schemas.microsoft.com/office/powerpoint/2010/main" val="2204171689"/>
-      </p:ext>
-    </p:extLst>
-  </p:cSld>
-  <p:clrMapOvr>
-    <a:masterClrMapping/>
-  </p:clrMapOvr>
-</p:sld>
-</file>
-
-<file path=ppt/slides/slide12.xml><?xml version="1.0" encoding="utf-8"?>
-<p:sld xmlns:a="http://schemas.openxmlformats.org/drawingml/2006/main" xmlns:r="http://schemas.openxmlformats.org/officeDocument/2006/relationships" xmlns:p="http://schemas.openxmlformats.org/presentationml/2006/main">
-  <p:cSld>
-    <p:spTree>
-      <p:nvGrpSpPr>
-        <p:cNvPr id="1" name=""/>
-        <p:cNvGrpSpPr/>
-        <p:nvPr/>
-      </p:nvGrpSpPr>
-      <p:grpSpPr>
-        <a:xfrm>
-          <a:off x="0" y="0"/>
-          <a:ext cx="0" cy="0"/>
-          <a:chOff x="0" y="0"/>
-          <a:chExt cx="0" cy="0"/>
-        </a:xfrm>
-      </p:grpSpPr>
-      <p:sp>
-        <p:nvSpPr>
-          <p:cNvPr id="2" name="Title 1">
-            <a:extLst>
-              <a:ext uri="{FF2B5EF4-FFF2-40B4-BE49-F238E27FC236}">
-                <a16:creationId xmlns:a16="http://schemas.microsoft.com/office/drawing/2014/main" id="{ED218587-5A19-4BE8-9A95-7DACAAC399E5}"/>
-              </a:ext>
-            </a:extLst>
-          </p:cNvPr>
-          <p:cNvSpPr>
-            <a:spLocks noGrp="1"/>
-          </p:cNvSpPr>
-          <p:nvPr>
-            <p:ph type="title"/>
-          </p:nvPr>
-        </p:nvSpPr>
-        <p:spPr/>
-        <p:txBody>
-          <a:bodyPr/>
-          <a:lstStyle/>
-          <a:p>
-            <a:r>
-              <a:rPr lang="en-US" dirty="0"/>
-              <a:t>Attempt at Classification</a:t>
-            </a:r>
-          </a:p>
-        </p:txBody>
-      </p:sp>
-      <p:sp>
-        <p:nvSpPr>
-          <p:cNvPr id="3" name="Content Placeholder 2">
-            <a:extLst>
-              <a:ext uri="{FF2B5EF4-FFF2-40B4-BE49-F238E27FC236}">
-                <a16:creationId xmlns:a16="http://schemas.microsoft.com/office/drawing/2014/main" id="{63184533-332C-492F-847F-372759A4BF55}"/>
-              </a:ext>
-            </a:extLst>
-          </p:cNvPr>
-          <p:cNvSpPr>
-            <a:spLocks noGrp="1"/>
-          </p:cNvSpPr>
-          <p:nvPr>
-            <p:ph idx="1"/>
-          </p:nvPr>
-        </p:nvSpPr>
-        <p:spPr/>
-        <p:txBody>
-          <a:bodyPr/>
-          <a:lstStyle/>
-          <a:p>
-            <a:r>
-              <a:rPr lang="en-US" dirty="0"/>
-              <a:t>Of all Major League Baseball players who were born between 1930 and 1945, 42% are deceased</a:t>
-            </a:r>
-          </a:p>
-          <a:p>
-            <a:r>
-              <a:rPr lang="en-US" dirty="0"/>
-              <a:t>Can we build a classification model to predict whether a player is still alive?</a:t>
-            </a:r>
-          </a:p>
-          <a:p>
-            <a:r>
-              <a:rPr lang="en-US" dirty="0"/>
-              <a:t>Based on length of career, numbers of games played, listed height and weight, no classification model achieved over 60% accuracy</a:t>
-            </a:r>
-          </a:p>
-          <a:p>
-            <a:r>
-              <a:rPr lang="en-US" dirty="0"/>
-              <a:t>As it turns out, no correlation between any of those characteristics with whether a player is still alive, or how long a player lived</a:t>
-            </a:r>
-          </a:p>
-          <a:p>
-            <a:pPr lvl="1"/>
-            <a:r>
-              <a:rPr lang="en-US" dirty="0"/>
-              <a:t>At best, a slight (and obvious) correlation exists with the year of birth and how long a player lived</a:t>
-            </a:r>
-          </a:p>
-        </p:txBody>
-      </p:sp>
-    </p:spTree>
-    <p:extLst>
-      <p:ext uri="{BB962C8B-B14F-4D97-AF65-F5344CB8AC3E}">
-        <p14:creationId xmlns:p14="http://schemas.microsoft.com/office/powerpoint/2010/main" val="445106356"/>
-      </p:ext>
-    </p:extLst>
-  </p:cSld>
-  <p:clrMapOvr>
-    <a:masterClrMapping/>
-  </p:clrMapOvr>
-</p:sld>
-</file>
-
-<file path=ppt/slides/slide13.xml><?xml version="1.0" encoding="utf-8"?>
-<p:sld xmlns:a="http://schemas.openxmlformats.org/drawingml/2006/main" xmlns:r="http://schemas.openxmlformats.org/officeDocument/2006/relationships" xmlns:p="http://schemas.openxmlformats.org/presentationml/2006/main">
-  <p:cSld>
-    <p:spTree>
-      <p:nvGrpSpPr>
-        <p:cNvPr id="1" name=""/>
-        <p:cNvGrpSpPr/>
-        <p:nvPr/>
-      </p:nvGrpSpPr>
-      <p:grpSpPr>
-        <a:xfrm>
-          <a:off x="0" y="0"/>
-          <a:ext cx="0" cy="0"/>
-          <a:chOff x="0" y="0"/>
-          <a:chExt cx="0" cy="0"/>
-        </a:xfrm>
-      </p:grpSpPr>
-      <p:sp>
-        <p:nvSpPr>
-          <p:cNvPr id="2" name="Title 1">
-            <a:extLst>
-              <a:ext uri="{FF2B5EF4-FFF2-40B4-BE49-F238E27FC236}">
-                <a16:creationId xmlns:a16="http://schemas.microsoft.com/office/drawing/2014/main" id="{0ADFE17C-E7F8-4D43-94F2-FD7F4E6E41FE}"/>
-              </a:ext>
-            </a:extLst>
-          </p:cNvPr>
-          <p:cNvSpPr>
-            <a:spLocks noGrp="1"/>
-          </p:cNvSpPr>
-          <p:nvPr>
-            <p:ph type="title"/>
-          </p:nvPr>
-        </p:nvSpPr>
-        <p:spPr/>
-        <p:txBody>
-          <a:bodyPr/>
-          <a:lstStyle/>
-          <a:p>
-            <a:r>
-              <a:rPr lang="en-US" dirty="0"/>
-              <a:t>Conclusions</a:t>
-            </a:r>
-          </a:p>
-        </p:txBody>
-      </p:sp>
-      <p:sp>
-        <p:nvSpPr>
-          <p:cNvPr id="3" name="Content Placeholder 2">
-            <a:extLst>
-              <a:ext uri="{FF2B5EF4-FFF2-40B4-BE49-F238E27FC236}">
-                <a16:creationId xmlns:a16="http://schemas.microsoft.com/office/drawing/2014/main" id="{80D4028D-82CE-433C-8918-338EB6571B62}"/>
-              </a:ext>
-            </a:extLst>
-          </p:cNvPr>
-          <p:cNvSpPr>
-            <a:spLocks noGrp="1"/>
-          </p:cNvSpPr>
-          <p:nvPr>
-            <p:ph idx="1"/>
-          </p:nvPr>
-        </p:nvSpPr>
-        <p:spPr/>
-        <p:txBody>
-          <a:bodyPr/>
-          <a:lstStyle/>
-          <a:p>
-            <a:r>
-              <a:rPr lang="en-US" dirty="0"/>
-              <a:t>Prediction of number of athlete deaths works reasonably well for NBA players, but consistently overestimates for the other sports (MLB, NFL, NHL).</a:t>
-            </a:r>
-          </a:p>
-          <a:p>
-            <a:r>
-              <a:rPr lang="en-US" dirty="0"/>
-              <a:t>Distribution of ages at death is not significantly different from the general American male population for NFL, NBA, or NHL players</a:t>
-            </a:r>
-          </a:p>
-          <a:p>
-            <a:r>
-              <a:rPr lang="en-US" dirty="0"/>
-              <a:t>However, Major League Baseball players seem to have higher life expectancies than players in other leagues</a:t>
-            </a:r>
-          </a:p>
-          <a:p>
-            <a:r>
-              <a:rPr lang="en-US" dirty="0"/>
-              <a:t>No correlations exist between life expectancy and length of playing career, or even physical dimensions of </a:t>
-            </a:r>
-            <a:r>
-              <a:rPr lang="en-US"/>
-              <a:t>professional athletes</a:t>
-            </a:r>
-            <a:endParaRPr lang="en-US" dirty="0"/>
-          </a:p>
-        </p:txBody>
-      </p:sp>
-    </p:spTree>
-    <p:extLst>
-      <p:ext uri="{BB962C8B-B14F-4D97-AF65-F5344CB8AC3E}">
-        <p14:creationId xmlns:p14="http://schemas.microsoft.com/office/powerpoint/2010/main" val="1265467141"/>
-      </p:ext>
-    </p:extLst>
-  </p:cSld>
-  <p:clrMapOvr>
-    <a:masterClrMapping/>
-  </p:clrMapOvr>
-</p:sld>
-</file>
-
-<file path=ppt/slides/slide2.xml><?xml version="1.0" encoding="utf-8"?>
-<p:sld xmlns:a="http://schemas.openxmlformats.org/drawingml/2006/main" xmlns:r="http://schemas.openxmlformats.org/officeDocument/2006/relationships" xmlns:p="http://schemas.openxmlformats.org/presentationml/2006/main">
-  <p:cSld>
-    <p:spTree>
-      <p:nvGrpSpPr>
-        <p:cNvPr id="1" name=""/>
-        <p:cNvGrpSpPr/>
-        <p:nvPr/>
-      </p:nvGrpSpPr>
-      <p:grpSpPr>
-        <a:xfrm>
-          <a:off x="0" y="0"/>
-          <a:ext cx="0" cy="0"/>
-          <a:chOff x="0" y="0"/>
-          <a:chExt cx="0" cy="0"/>
-        </a:xfrm>
-      </p:grpSpPr>
-      <p:sp>
-        <p:nvSpPr>
-          <p:cNvPr id="2" name="Title 1">
-            <a:extLst>
-              <a:ext uri="{FF2B5EF4-FFF2-40B4-BE49-F238E27FC236}">
-                <a16:creationId xmlns:a16="http://schemas.microsoft.com/office/drawing/2014/main" id="{B59EB874-36F7-490B-88ED-81E91BA31A99}"/>
-              </a:ext>
-            </a:extLst>
-          </p:cNvPr>
-          <p:cNvSpPr>
-            <a:spLocks noGrp="1"/>
-          </p:cNvSpPr>
-          <p:nvPr>
-            <p:ph type="title"/>
-          </p:nvPr>
-        </p:nvSpPr>
-        <p:spPr/>
-        <p:txBody>
-          <a:bodyPr/>
-          <a:lstStyle/>
-          <a:p>
-            <a:r>
-              <a:rPr lang="en-US" dirty="0"/>
-              <a:t>Problem Statement</a:t>
-            </a:r>
-          </a:p>
-        </p:txBody>
-      </p:sp>
-      <p:sp>
-        <p:nvSpPr>
-          <p:cNvPr id="3" name="Content Placeholder 2">
-            <a:extLst>
-              <a:ext uri="{FF2B5EF4-FFF2-40B4-BE49-F238E27FC236}">
-                <a16:creationId xmlns:a16="http://schemas.microsoft.com/office/drawing/2014/main" id="{9F896558-572F-4C0E-983A-C3C2786F0CBB}"/>
-              </a:ext>
-            </a:extLst>
-          </p:cNvPr>
-          <p:cNvSpPr>
-            <a:spLocks noGrp="1"/>
-          </p:cNvSpPr>
-          <p:nvPr>
-            <p:ph idx="1"/>
-          </p:nvPr>
-        </p:nvSpPr>
-        <p:spPr/>
-        <p:txBody>
-          <a:bodyPr/>
-          <a:lstStyle/>
-          <a:p>
-            <a:r>
-              <a:rPr lang="en-US" dirty="0"/>
-              <a:t>What impact does a career in professional sports have on the life expectancy of an athlete?</a:t>
-            </a:r>
-          </a:p>
-          <a:p>
-            <a:r>
-              <a:rPr lang="en-US" dirty="0"/>
-              <a:t>Can we build a model to predict how many athletes will die in a given year?</a:t>
-            </a:r>
-          </a:p>
-          <a:p>
-            <a:r>
-              <a:rPr lang="en-US" dirty="0"/>
-              <a:t>How does the distribution of ages at death of athletes compare to that of the general population?</a:t>
-            </a:r>
-          </a:p>
-          <a:p>
-            <a:r>
-              <a:rPr lang="en-US" dirty="0"/>
-              <a:t>Of athletes who were born in a certain time period, can we predict whether they are still alive, or how long they lived based on the length of their playing careers or their physical dimensions?</a:t>
-            </a:r>
-          </a:p>
-        </p:txBody>
-      </p:sp>
-    </p:spTree>
-    <p:extLst>
-      <p:ext uri="{BB962C8B-B14F-4D97-AF65-F5344CB8AC3E}">
-        <p14:creationId xmlns:p14="http://schemas.microsoft.com/office/powerpoint/2010/main" val="4178919864"/>
-      </p:ext>
-    </p:extLst>
-  </p:cSld>
-  <p:clrMapOvr>
-    <a:masterClrMapping/>
-  </p:clrMapOvr>
-</p:sld>
-</file>
-
-<file path=ppt/slides/slide3.xml><?xml version="1.0" encoding="utf-8"?>
-<p:sld xmlns:a="http://schemas.openxmlformats.org/drawingml/2006/main" xmlns:r="http://schemas.openxmlformats.org/officeDocument/2006/relationships" xmlns:p="http://schemas.openxmlformats.org/presentationml/2006/main">
-  <p:cSld>
-    <p:spTree>
-      <p:nvGrpSpPr>
-        <p:cNvPr id="1" name=""/>
-        <p:cNvGrpSpPr/>
-        <p:nvPr/>
-      </p:nvGrpSpPr>
-      <p:grpSpPr>
-        <a:xfrm>
-          <a:off x="0" y="0"/>
-          <a:ext cx="0" cy="0"/>
-          <a:chOff x="0" y="0"/>
-          <a:chExt cx="0" cy="0"/>
-        </a:xfrm>
-      </p:grpSpPr>
-      <p:sp>
-        <p:nvSpPr>
-          <p:cNvPr id="2" name="Title 1">
-            <a:extLst>
-              <a:ext uri="{FF2B5EF4-FFF2-40B4-BE49-F238E27FC236}">
-                <a16:creationId xmlns:a16="http://schemas.microsoft.com/office/drawing/2014/main" id="{DC777E8D-D457-45EF-8569-B2D685B5C83A}"/>
-              </a:ext>
-            </a:extLst>
-          </p:cNvPr>
-          <p:cNvSpPr>
-            <a:spLocks noGrp="1"/>
-          </p:cNvSpPr>
-          <p:nvPr>
-            <p:ph type="title"/>
-          </p:nvPr>
-        </p:nvSpPr>
-        <p:spPr/>
-        <p:txBody>
-          <a:bodyPr/>
-          <a:lstStyle/>
-          <a:p>
-            <a:r>
-              <a:rPr lang="en-US" dirty="0"/>
-              <a:t>Collecting Player Data</a:t>
-            </a:r>
-          </a:p>
-        </p:txBody>
-      </p:sp>
-      <p:sp>
-        <p:nvSpPr>
-          <p:cNvPr id="3" name="Content Placeholder 2">
-            <a:extLst>
-              <a:ext uri="{FF2B5EF4-FFF2-40B4-BE49-F238E27FC236}">
-                <a16:creationId xmlns:a16="http://schemas.microsoft.com/office/drawing/2014/main" id="{1AE762C2-2CF7-4781-9287-1E9A519825D5}"/>
-              </a:ext>
-            </a:extLst>
-          </p:cNvPr>
-          <p:cNvSpPr>
-            <a:spLocks noGrp="1"/>
-          </p:cNvSpPr>
-          <p:nvPr>
-            <p:ph idx="1"/>
-          </p:nvPr>
-        </p:nvSpPr>
-        <p:spPr/>
-        <p:txBody>
-          <a:bodyPr/>
-          <a:lstStyle/>
-          <a:p>
-            <a:r>
-              <a:rPr lang="en-US" dirty="0"/>
-              <a:t>Player data was collected from the following sites:</a:t>
-            </a:r>
-          </a:p>
-          <a:p>
-            <a:pPr lvl="1"/>
-            <a:r>
-              <a:rPr lang="en-US" dirty="0"/>
-              <a:t>Baseball-reference.com</a:t>
-            </a:r>
-          </a:p>
-          <a:p>
-            <a:pPr lvl="1"/>
-            <a:r>
-              <a:rPr lang="en-US" dirty="0"/>
-              <a:t>Pro-football-reference.com</a:t>
-            </a:r>
-          </a:p>
-          <a:p>
-            <a:pPr lvl="1"/>
-            <a:r>
-              <a:rPr lang="en-US" dirty="0"/>
-              <a:t>Basketball-reference.com</a:t>
-            </a:r>
-          </a:p>
-          <a:p>
-            <a:pPr lvl="1"/>
-            <a:r>
-              <a:rPr lang="en-US" dirty="0"/>
-              <a:t>Hockey-reference.com</a:t>
-            </a:r>
-          </a:p>
-          <a:p>
-            <a:r>
-              <a:rPr lang="en-US" dirty="0"/>
-              <a:t>From each site, data was collected (or inferred) about each player:</a:t>
-            </a:r>
-          </a:p>
-          <a:p>
-            <a:pPr lvl="1"/>
-            <a:r>
-              <a:rPr lang="en-US" dirty="0"/>
-              <a:t>Date of birth and death</a:t>
-            </a:r>
-          </a:p>
-          <a:p>
-            <a:pPr lvl="1"/>
-            <a:r>
-              <a:rPr lang="en-US" dirty="0"/>
-              <a:t>Age at death</a:t>
-            </a:r>
-          </a:p>
-          <a:p>
-            <a:pPr lvl="1"/>
-            <a:r>
-              <a:rPr lang="en-US" dirty="0"/>
-              <a:t>Length of career: number of seasons and games played</a:t>
-            </a:r>
-          </a:p>
-          <a:p>
-            <a:pPr lvl="1"/>
-            <a:r>
-              <a:rPr lang="en-US" dirty="0"/>
-              <a:t>Height and weight (for selected baseball and football players)</a:t>
-            </a:r>
-          </a:p>
-        </p:txBody>
-      </p:sp>
-    </p:spTree>
-    <p:extLst>
-      <p:ext uri="{BB962C8B-B14F-4D97-AF65-F5344CB8AC3E}">
-        <p14:creationId xmlns:p14="http://schemas.microsoft.com/office/powerpoint/2010/main" val="680091926"/>
-      </p:ext>
-    </p:extLst>
-  </p:cSld>
-  <p:clrMapOvr>
-    <a:masterClrMapping/>
-  </p:clrMapOvr>
-</p:sld>
-</file>
-
-<file path=ppt/slides/slide4.xml><?xml version="1.0" encoding="utf-8"?>
-<p:sld xmlns:a="http://schemas.openxmlformats.org/drawingml/2006/main" xmlns:r="http://schemas.openxmlformats.org/officeDocument/2006/relationships" xmlns:p="http://schemas.openxmlformats.org/presentationml/2006/main">
-  <p:cSld>
-    <p:spTree>
-      <p:nvGrpSpPr>
-        <p:cNvPr id="1" name=""/>
-        <p:cNvGrpSpPr/>
-        <p:nvPr/>
-      </p:nvGrpSpPr>
-      <p:grpSpPr>
-        <a:xfrm>
-          <a:off x="0" y="0"/>
-          <a:ext cx="0" cy="0"/>
-          <a:chOff x="0" y="0"/>
-          <a:chExt cx="0" cy="0"/>
-        </a:xfrm>
-      </p:grpSpPr>
-      <p:sp>
-        <p:nvSpPr>
-          <p:cNvPr id="2" name="Title 1">
-            <a:extLst>
-              <a:ext uri="{FF2B5EF4-FFF2-40B4-BE49-F238E27FC236}">
-                <a16:creationId xmlns:a16="http://schemas.microsoft.com/office/drawing/2014/main" id="{9D3A370D-3770-4352-90D7-4B9117B4453D}"/>
-              </a:ext>
-            </a:extLst>
-          </p:cNvPr>
-          <p:cNvSpPr>
-            <a:spLocks noGrp="1"/>
-          </p:cNvSpPr>
-          <p:nvPr>
-            <p:ph type="title"/>
-          </p:nvPr>
-        </p:nvSpPr>
-        <p:spPr/>
-        <p:txBody>
-          <a:bodyPr/>
-          <a:lstStyle/>
-          <a:p>
-            <a:r>
-              <a:rPr lang="en-US" dirty="0"/>
-              <a:t>Vital Statistics of General Population</a:t>
-            </a:r>
-          </a:p>
-        </p:txBody>
-      </p:sp>
-      <p:sp>
-        <p:nvSpPr>
-          <p:cNvPr id="3" name="Content Placeholder 2">
-            <a:extLst>
-              <a:ext uri="{FF2B5EF4-FFF2-40B4-BE49-F238E27FC236}">
-                <a16:creationId xmlns:a16="http://schemas.microsoft.com/office/drawing/2014/main" id="{7670B50C-EF08-4F56-9C53-EAF5896E6283}"/>
-              </a:ext>
-            </a:extLst>
-          </p:cNvPr>
-          <p:cNvSpPr>
-            <a:spLocks noGrp="1"/>
-          </p:cNvSpPr>
-          <p:nvPr>
-            <p:ph idx="1"/>
-          </p:nvPr>
-        </p:nvSpPr>
-        <p:spPr/>
-        <p:txBody>
-          <a:bodyPr/>
-          <a:lstStyle/>
-          <a:p>
-            <a:r>
-              <a:rPr lang="en-US" dirty="0"/>
-              <a:t>Life expectancy tables from 2004 to 2015 were collected from the Social Security Administration</a:t>
-            </a:r>
-          </a:p>
-          <a:p>
-            <a:r>
-              <a:rPr lang="en-US" dirty="0"/>
-              <a:t>Number of annual live births in the United States were taken from the Center of Disease Control and Prevention</a:t>
-            </a:r>
-          </a:p>
-        </p:txBody>
-      </p:sp>
-    </p:spTree>
-    <p:extLst>
-      <p:ext uri="{BB962C8B-B14F-4D97-AF65-F5344CB8AC3E}">
-        <p14:creationId xmlns:p14="http://schemas.microsoft.com/office/powerpoint/2010/main" val="1500587411"/>
-      </p:ext>
-    </p:extLst>
-  </p:cSld>
-  <p:clrMapOvr>
-    <a:masterClrMapping/>
-  </p:clrMapOvr>
-</p:sld>
-</file>
-
-<file path=ppt/slides/slide5.xml><?xml version="1.0" encoding="utf-8"?>
-<p:sld xmlns:a="http://schemas.openxmlformats.org/drawingml/2006/main" xmlns:r="http://schemas.openxmlformats.org/officeDocument/2006/relationships" xmlns:p="http://schemas.openxmlformats.org/presentationml/2006/main">
-  <p:cSld>
-    <p:spTree>
-      <p:nvGrpSpPr>
-        <p:cNvPr id="1" name=""/>
-        <p:cNvGrpSpPr/>
-        <p:nvPr/>
-      </p:nvGrpSpPr>
-      <p:grpSpPr>
-        <a:xfrm>
-          <a:off x="0" y="0"/>
-          <a:ext cx="0" cy="0"/>
-          <a:chOff x="0" y="0"/>
-          <a:chExt cx="0" cy="0"/>
-        </a:xfrm>
-      </p:grpSpPr>
-      <p:sp>
-        <p:nvSpPr>
-          <p:cNvPr id="2" name="Title 1">
-            <a:extLst>
-              <a:ext uri="{FF2B5EF4-FFF2-40B4-BE49-F238E27FC236}">
-                <a16:creationId xmlns:a16="http://schemas.microsoft.com/office/drawing/2014/main" id="{7231B108-1EFF-4503-BD48-AF01051057FA}"/>
-              </a:ext>
-            </a:extLst>
-          </p:cNvPr>
-          <p:cNvSpPr>
-            <a:spLocks noGrp="1"/>
-          </p:cNvSpPr>
-          <p:nvPr>
-            <p:ph type="title"/>
-          </p:nvPr>
-        </p:nvSpPr>
-        <p:spPr/>
-        <p:txBody>
-          <a:bodyPr/>
-          <a:lstStyle/>
-          <a:p>
-            <a:r>
-              <a:rPr lang="en-US" dirty="0"/>
-              <a:t>Annual Number of Births and Deaths of Professional Athletes</a:t>
-            </a:r>
-          </a:p>
-        </p:txBody>
-      </p:sp>
-      <p:pic>
-        <p:nvPicPr>
-          <p:cNvPr id="5" name="Picture 4">
-            <a:extLst>
-              <a:ext uri="{FF2B5EF4-FFF2-40B4-BE49-F238E27FC236}">
-                <a16:creationId xmlns:a16="http://schemas.microsoft.com/office/drawing/2014/main" id="{1178665C-542B-422A-B47E-D1738645262C}"/>
-              </a:ext>
-            </a:extLst>
-          </p:cNvPr>
-          <p:cNvPicPr>
-            <a:picLocks noChangeAspect="1"/>
-          </p:cNvPicPr>
-          <p:nvPr/>
-        </p:nvPicPr>
-        <p:blipFill>
-          <a:blip r:embed="rId2"/>
-          <a:stretch>
-            <a:fillRect/>
-          </a:stretch>
-        </p:blipFill>
-        <p:spPr>
-          <a:xfrm>
-            <a:off x="677334" y="2079155"/>
-            <a:ext cx="4743450" cy="3400425"/>
-          </a:xfrm>
-          <a:prstGeom prst="rect">
-            <a:avLst/>
-          </a:prstGeom>
-        </p:spPr>
-      </p:pic>
-      <p:pic>
-        <p:nvPicPr>
-          <p:cNvPr id="9" name="Picture 8">
-            <a:extLst>
-              <a:ext uri="{FF2B5EF4-FFF2-40B4-BE49-F238E27FC236}">
-                <a16:creationId xmlns:a16="http://schemas.microsoft.com/office/drawing/2014/main" id="{E9F3AF72-E3C3-491D-A2F7-612A37F160AA}"/>
-              </a:ext>
-            </a:extLst>
-          </p:cNvPr>
-          <p:cNvPicPr>
-            <a:picLocks noChangeAspect="1"/>
-          </p:cNvPicPr>
-          <p:nvPr/>
-        </p:nvPicPr>
-        <p:blipFill>
-          <a:blip r:embed="rId3"/>
-          <a:stretch>
-            <a:fillRect/>
-          </a:stretch>
-        </p:blipFill>
-        <p:spPr>
-          <a:xfrm>
-            <a:off x="5974066" y="2079154"/>
-            <a:ext cx="4743450" cy="3400425"/>
-          </a:xfrm>
-          <a:prstGeom prst="rect">
-            <a:avLst/>
-          </a:prstGeom>
-        </p:spPr>
-      </p:pic>
-    </p:spTree>
-    <p:extLst>
-      <p:ext uri="{BB962C8B-B14F-4D97-AF65-F5344CB8AC3E}">
-        <p14:creationId xmlns:p14="http://schemas.microsoft.com/office/powerpoint/2010/main" val="361064940"/>
-      </p:ext>
-    </p:extLst>
-  </p:cSld>
-  <p:clrMapOvr>
-    <a:masterClrMapping/>
-  </p:clrMapOvr>
-</p:sld>
-</file>
-
-<file path=ppt/slides/slide6.xml><?xml version="1.0" encoding="utf-8"?>
-<p:sld xmlns:a="http://schemas.openxmlformats.org/drawingml/2006/main" xmlns:r="http://schemas.openxmlformats.org/officeDocument/2006/relationships" xmlns:p="http://schemas.openxmlformats.org/presentationml/2006/main">
-  <p:cSld>
-    <p:spTree>
-      <p:nvGrpSpPr>
-        <p:cNvPr id="1" name=""/>
-        <p:cNvGrpSpPr/>
-        <p:nvPr/>
-      </p:nvGrpSpPr>
-      <p:grpSpPr>
-        <a:xfrm>
-          <a:off x="0" y="0"/>
-          <a:ext cx="0" cy="0"/>
-          <a:chOff x="0" y="0"/>
-          <a:chExt cx="0" cy="0"/>
-        </a:xfrm>
-      </p:grpSpPr>
-      <p:sp>
-        <p:nvSpPr>
-          <p:cNvPr id="2" name="Title 1">
-            <a:extLst>
-              <a:ext uri="{FF2B5EF4-FFF2-40B4-BE49-F238E27FC236}">
-                <a16:creationId xmlns:a16="http://schemas.microsoft.com/office/drawing/2014/main" id="{1457026B-0792-44C8-91B0-D675F3CF4603}"/>
-              </a:ext>
-            </a:extLst>
-          </p:cNvPr>
-          <p:cNvSpPr>
-            <a:spLocks noGrp="1"/>
-          </p:cNvSpPr>
-          <p:nvPr>
-            <p:ph type="title"/>
-          </p:nvPr>
-        </p:nvSpPr>
-        <p:spPr/>
-        <p:txBody>
-          <a:bodyPr/>
-          <a:lstStyle/>
-          <a:p>
-            <a:r>
-              <a:rPr lang="en-US" dirty="0"/>
-              <a:t>Annual Number of Births and Deaths of Professional Athletes</a:t>
-            </a:r>
-          </a:p>
-        </p:txBody>
-      </p:sp>
-      <p:pic>
-        <p:nvPicPr>
-          <p:cNvPr id="3" name="Picture 2">
-            <a:extLst>
-              <a:ext uri="{FF2B5EF4-FFF2-40B4-BE49-F238E27FC236}">
-                <a16:creationId xmlns:a16="http://schemas.microsoft.com/office/drawing/2014/main" id="{38C9E4E8-121E-4008-9782-563BCD5B6255}"/>
-              </a:ext>
-            </a:extLst>
-          </p:cNvPr>
-          <p:cNvPicPr>
-            <a:picLocks noChangeAspect="1"/>
-          </p:cNvPicPr>
-          <p:nvPr/>
-        </p:nvPicPr>
-        <p:blipFill>
-          <a:blip r:embed="rId2"/>
-          <a:stretch>
-            <a:fillRect/>
-          </a:stretch>
-        </p:blipFill>
-        <p:spPr>
-          <a:xfrm>
-            <a:off x="972585" y="2632017"/>
-            <a:ext cx="4436229" cy="3195004"/>
-          </a:xfrm>
-          <a:prstGeom prst="rect">
-            <a:avLst/>
-          </a:prstGeom>
-        </p:spPr>
-      </p:pic>
-      <p:pic>
-        <p:nvPicPr>
-          <p:cNvPr id="5" name="Picture 4">
-            <a:extLst>
-              <a:ext uri="{FF2B5EF4-FFF2-40B4-BE49-F238E27FC236}">
-                <a16:creationId xmlns:a16="http://schemas.microsoft.com/office/drawing/2014/main" id="{9F11C9F0-1D58-4619-A007-71D45A587E12}"/>
-              </a:ext>
-            </a:extLst>
-          </p:cNvPr>
-          <p:cNvPicPr>
-            <a:picLocks noChangeAspect="1"/>
-          </p:cNvPicPr>
-          <p:nvPr/>
-        </p:nvPicPr>
-        <p:blipFill>
-          <a:blip r:embed="rId3"/>
-          <a:stretch>
-            <a:fillRect/>
-          </a:stretch>
-        </p:blipFill>
-        <p:spPr>
-          <a:xfrm>
-            <a:off x="5780785" y="2660015"/>
-            <a:ext cx="4614869" cy="3272790"/>
-          </a:xfrm>
-          <a:prstGeom prst="rect">
-            <a:avLst/>
-          </a:prstGeom>
-        </p:spPr>
-      </p:pic>
-    </p:spTree>
-    <p:extLst>
-      <p:ext uri="{BB962C8B-B14F-4D97-AF65-F5344CB8AC3E}">
-        <p14:creationId xmlns:p14="http://schemas.microsoft.com/office/powerpoint/2010/main" val="2590267788"/>
-      </p:ext>
-    </p:extLst>
-  </p:cSld>
-  <p:clrMapOvr>
-    <a:masterClrMapping/>
-  </p:clrMapOvr>
-</p:sld>
-</file>
-
-<file path=ppt/slides/slide7.xml><?xml version="1.0" encoding="utf-8"?>
-<p:sld xmlns:a="http://schemas.openxmlformats.org/drawingml/2006/main" xmlns:r="http://schemas.openxmlformats.org/officeDocument/2006/relationships" xmlns:p="http://schemas.openxmlformats.org/presentationml/2006/main">
-  <p:cSld>
-    <p:spTree>
-      <p:nvGrpSpPr>
-        <p:cNvPr id="1" name=""/>
-        <p:cNvGrpSpPr/>
-        <p:nvPr/>
-      </p:nvGrpSpPr>
-      <p:grpSpPr>
-        <a:xfrm>
-          <a:off x="0" y="0"/>
-          <a:ext cx="0" cy="0"/>
-          <a:chOff x="0" y="0"/>
-          <a:chExt cx="0" cy="0"/>
-        </a:xfrm>
-      </p:grpSpPr>
-      <p:sp>
-        <p:nvSpPr>
-          <p:cNvPr id="2" name="Title 1">
-            <a:extLst>
-              <a:ext uri="{FF2B5EF4-FFF2-40B4-BE49-F238E27FC236}">
-                <a16:creationId xmlns:a16="http://schemas.microsoft.com/office/drawing/2014/main" id="{32E6D829-5E92-4177-8887-3223DEDD11F5}"/>
-              </a:ext>
-            </a:extLst>
-          </p:cNvPr>
-          <p:cNvSpPr>
-            <a:spLocks noGrp="1"/>
-          </p:cNvSpPr>
-          <p:nvPr>
-            <p:ph type="title"/>
-          </p:nvPr>
-        </p:nvSpPr>
-        <p:spPr/>
-        <p:txBody>
-          <a:bodyPr/>
-          <a:lstStyle/>
-          <a:p>
-            <a:r>
-              <a:rPr lang="en-US" dirty="0"/>
-              <a:t>Modeling Number of Athlete Deaths</a:t>
-            </a:r>
-          </a:p>
-        </p:txBody>
-      </p:sp>
-      <p:sp>
-        <p:nvSpPr>
-          <p:cNvPr id="3" name="Content Placeholder 2">
-            <a:extLst>
-              <a:ext uri="{FF2B5EF4-FFF2-40B4-BE49-F238E27FC236}">
-                <a16:creationId xmlns:a16="http://schemas.microsoft.com/office/drawing/2014/main" id="{53E33BBD-664B-44BC-923D-5AA937C1E8CA}"/>
-              </a:ext>
-            </a:extLst>
-          </p:cNvPr>
-          <p:cNvSpPr>
-            <a:spLocks noGrp="1"/>
-          </p:cNvSpPr>
-          <p:nvPr>
-            <p:ph idx="1"/>
-          </p:nvPr>
-        </p:nvSpPr>
-        <p:spPr/>
-        <p:txBody>
-          <a:bodyPr/>
-          <a:lstStyle/>
-          <a:p>
-            <a:r>
-              <a:rPr lang="en-US" dirty="0"/>
-              <a:t>Example: how many NBA players will die in 2015?</a:t>
-            </a:r>
-          </a:p>
-          <a:p>
-            <a:r>
-              <a:rPr lang="en-US" dirty="0"/>
-              <a:t>For each year in the 2015 SSA Life Table, estimate percentage of males who were born that year that will die in 2015</a:t>
-            </a:r>
-          </a:p>
-          <a:p>
-            <a:pPr lvl="1"/>
-            <a:r>
-              <a:rPr lang="en-US" dirty="0"/>
-              <a:t>Example: roughly 3.5% of males born in 1930 will die in 2015</a:t>
-            </a:r>
-          </a:p>
-          <a:p>
-            <a:r>
-              <a:rPr lang="en-US" dirty="0"/>
-              <a:t>Multiply that estimated percentage to the number of athletes who were born in that year to get expected number of athletes who will die at that age</a:t>
-            </a:r>
-          </a:p>
-          <a:p>
-            <a:pPr lvl="1"/>
-            <a:r>
-              <a:rPr lang="en-US" dirty="0"/>
-              <a:t>Of the 39 players born in 1930, about 0.035 * 39 = 1.365 will die in 2015</a:t>
-            </a:r>
-          </a:p>
-          <a:p>
-            <a:r>
-              <a:rPr lang="en-US" dirty="0"/>
-              <a:t>Sum up the expected number of deaths for each birth year to get total expected number of athlete deaths</a:t>
-            </a:r>
-          </a:p>
-          <a:p>
-            <a:pPr lvl="1"/>
-            <a:r>
-              <a:rPr lang="en-US" dirty="0"/>
-              <a:t>For NBA players 2015, expected number is 43.9 deaths. In actuality, 47 players died.</a:t>
-            </a:r>
-          </a:p>
-        </p:txBody>
-      </p:sp>
-    </p:spTree>
-    <p:extLst>
-      <p:ext uri="{BB962C8B-B14F-4D97-AF65-F5344CB8AC3E}">
-        <p14:creationId xmlns:p14="http://schemas.microsoft.com/office/powerpoint/2010/main" val="3318864619"/>
-      </p:ext>
-    </p:extLst>
-  </p:cSld>
-  <p:clrMapOvr>
-    <a:masterClrMapping/>
-  </p:clrMapOvr>
-</p:sld>
-</file>
-
-<file path=ppt/slides/slide8.xml><?xml version="1.0" encoding="utf-8"?>
-<p:sld xmlns:a="http://schemas.openxmlformats.org/drawingml/2006/main" xmlns:r="http://schemas.openxmlformats.org/officeDocument/2006/relationships" xmlns:p="http://schemas.openxmlformats.org/presentationml/2006/main">
-  <p:cSld>
-    <p:spTree>
-      <p:nvGrpSpPr>
-        <p:cNvPr id="1" name=""/>
-        <p:cNvGrpSpPr/>
-        <p:nvPr/>
-      </p:nvGrpSpPr>
-      <p:grpSpPr>
-        <a:xfrm>
-          <a:off x="0" y="0"/>
-          <a:ext cx="0" cy="0"/>
-          <a:chOff x="0" y="0"/>
-          <a:chExt cx="0" cy="0"/>
-        </a:xfrm>
-      </p:grpSpPr>
-      <p:sp>
-        <p:nvSpPr>
-          <p:cNvPr id="2" name="Title 1">
-            <a:extLst>
-              <a:ext uri="{FF2B5EF4-FFF2-40B4-BE49-F238E27FC236}">
-                <a16:creationId xmlns:a16="http://schemas.microsoft.com/office/drawing/2014/main" id="{6B8B5520-EFFA-46D9-89DF-1434C63E1356}"/>
-              </a:ext>
-            </a:extLst>
-          </p:cNvPr>
-          <p:cNvSpPr>
-            <a:spLocks noGrp="1"/>
-          </p:cNvSpPr>
-          <p:nvPr>
-            <p:ph type="title"/>
-          </p:nvPr>
-        </p:nvSpPr>
-        <p:spPr/>
-        <p:txBody>
-          <a:bodyPr/>
-          <a:lstStyle/>
-          <a:p>
-            <a:r>
-              <a:rPr lang="en-US" dirty="0"/>
-              <a:t>Comparison of Predictions with Actual Number of Deaths</a:t>
-            </a:r>
-          </a:p>
-        </p:txBody>
-      </p:sp>
-      <p:pic>
-        <p:nvPicPr>
-          <p:cNvPr id="9" name="Picture 8">
-            <a:extLst>
-              <a:ext uri="{FF2B5EF4-FFF2-40B4-BE49-F238E27FC236}">
-                <a16:creationId xmlns:a16="http://schemas.microsoft.com/office/drawing/2014/main" id="{2BCF88C4-E361-4799-8DDB-848014042207}"/>
-              </a:ext>
-            </a:extLst>
-          </p:cNvPr>
-          <p:cNvPicPr>
-            <a:picLocks noChangeAspect="1"/>
-          </p:cNvPicPr>
-          <p:nvPr/>
-        </p:nvPicPr>
-        <p:blipFill>
-          <a:blip r:embed="rId2"/>
-          <a:stretch>
-            <a:fillRect/>
-          </a:stretch>
-        </p:blipFill>
-        <p:spPr>
-          <a:xfrm>
-            <a:off x="767974" y="2268080"/>
-            <a:ext cx="4848225" cy="3400425"/>
-          </a:xfrm>
-          <a:prstGeom prst="rect">
-            <a:avLst/>
-          </a:prstGeom>
-        </p:spPr>
-      </p:pic>
-      <p:pic>
-        <p:nvPicPr>
-          <p:cNvPr id="11" name="Picture 10">
-            <a:extLst>
-              <a:ext uri="{FF2B5EF4-FFF2-40B4-BE49-F238E27FC236}">
-                <a16:creationId xmlns:a16="http://schemas.microsoft.com/office/drawing/2014/main" id="{D224C962-22EE-4E04-9FB7-BBDE8ED4CCD5}"/>
-              </a:ext>
-            </a:extLst>
-          </p:cNvPr>
-          <p:cNvPicPr>
-            <a:picLocks noChangeAspect="1"/>
-          </p:cNvPicPr>
-          <p:nvPr/>
-        </p:nvPicPr>
-        <p:blipFill>
-          <a:blip r:embed="rId3"/>
-          <a:stretch>
-            <a:fillRect/>
-          </a:stretch>
-        </p:blipFill>
-        <p:spPr>
-          <a:xfrm>
-            <a:off x="6096000" y="2268079"/>
-            <a:ext cx="4848225" cy="3400425"/>
-          </a:xfrm>
-          <a:prstGeom prst="rect">
-            <a:avLst/>
-          </a:prstGeom>
-        </p:spPr>
-      </p:pic>
-    </p:spTree>
-    <p:extLst>
-      <p:ext uri="{BB962C8B-B14F-4D97-AF65-F5344CB8AC3E}">
-        <p14:creationId xmlns:p14="http://schemas.microsoft.com/office/powerpoint/2010/main" val="1562408056"/>
-      </p:ext>
-    </p:extLst>
-  </p:cSld>
-  <p:clrMapOvr>
-    <a:masterClrMapping/>
-  </p:clrMapOvr>
-</p:sld>
-</file>
-
-<file path=ppt/slides/slide9.xml><?xml version="1.0" encoding="utf-8"?>
 <p:sld xmlns:a="http://schemas.openxmlformats.org/drawingml/2006/main" xmlns:r="http://schemas.openxmlformats.org/officeDocument/2006/relationships" xmlns:p="http://schemas.openxmlformats.org/presentationml/2006/main">
   <p:cSld>
     <p:spTree>
@@ -7227,10 +6270,1869 @@
 </p:sld>
 </file>
 
+<file path=ppt/slides/slide11.xml><?xml version="1.0" encoding="utf-8"?>
+<p:sld xmlns:a="http://schemas.openxmlformats.org/drawingml/2006/main" xmlns:r="http://schemas.openxmlformats.org/officeDocument/2006/relationships" xmlns:p="http://schemas.openxmlformats.org/presentationml/2006/main">
+  <p:cSld>
+    <p:spTree>
+      <p:nvGrpSpPr>
+        <p:cNvPr id="1" name=""/>
+        <p:cNvGrpSpPr/>
+        <p:nvPr/>
+      </p:nvGrpSpPr>
+      <p:grpSpPr>
+        <a:xfrm>
+          <a:off x="0" y="0"/>
+          <a:ext cx="0" cy="0"/>
+          <a:chOff x="0" y="0"/>
+          <a:chExt cx="0" cy="0"/>
+        </a:xfrm>
+      </p:grpSpPr>
+      <p:sp>
+        <p:nvSpPr>
+          <p:cNvPr id="2" name="Title 1">
+            <a:extLst>
+              <a:ext uri="{FF2B5EF4-FFF2-40B4-BE49-F238E27FC236}">
+                <a16:creationId xmlns:a16="http://schemas.microsoft.com/office/drawing/2014/main" id="{1FA64C33-C1FD-42C1-8F71-0CFD8C41F557}"/>
+              </a:ext>
+            </a:extLst>
+          </p:cNvPr>
+          <p:cNvSpPr>
+            <a:spLocks noGrp="1"/>
+          </p:cNvSpPr>
+          <p:nvPr>
+            <p:ph type="title"/>
+          </p:nvPr>
+        </p:nvSpPr>
+        <p:spPr/>
+        <p:txBody>
+          <a:bodyPr/>
+          <a:lstStyle/>
+          <a:p>
+            <a:r>
+              <a:rPr lang="en-US" dirty="0"/>
+              <a:t>Comparison of Distributions of Ages at Death</a:t>
+            </a:r>
+          </a:p>
+        </p:txBody>
+      </p:sp>
+      <p:sp>
+        <p:nvSpPr>
+          <p:cNvPr id="3" name="Content Placeholder 2">
+            <a:extLst>
+              <a:ext uri="{FF2B5EF4-FFF2-40B4-BE49-F238E27FC236}">
+                <a16:creationId xmlns:a16="http://schemas.microsoft.com/office/drawing/2014/main" id="{A6E625F1-71B9-4828-B8B4-E19DB5FA8922}"/>
+              </a:ext>
+            </a:extLst>
+          </p:cNvPr>
+          <p:cNvSpPr>
+            <a:spLocks noGrp="1"/>
+          </p:cNvSpPr>
+          <p:nvPr>
+            <p:ph idx="1"/>
+          </p:nvPr>
+        </p:nvSpPr>
+        <p:spPr/>
+        <p:txBody>
+          <a:bodyPr/>
+          <a:lstStyle/>
+          <a:p>
+            <a:r>
+              <a:rPr lang="en-US" dirty="0"/>
+              <a:t>Conduct an A/B test between two population samples to determine how likely their ages at death are from same distribution</a:t>
+            </a:r>
+          </a:p>
+          <a:p>
+            <a:pPr lvl="1"/>
+            <a:r>
+              <a:rPr lang="en-US" dirty="0"/>
+              <a:t>First group: all athletes of a particular sport who died in a particular year</a:t>
+            </a:r>
+          </a:p>
+          <a:p>
+            <a:pPr lvl="1"/>
+            <a:r>
+              <a:rPr lang="en-US" dirty="0"/>
+              <a:t>Second group: general population of American males who died in a particular year</a:t>
+            </a:r>
+          </a:p>
+          <a:p>
+            <a:r>
+              <a:rPr lang="en-US" dirty="0"/>
+              <a:t>For NBA, NHL, and NFL athletes, A/B test did not reveal any conclusive differences between the athletes’ ages at death with those of the general population</a:t>
+            </a:r>
+          </a:p>
+          <a:p>
+            <a:pPr lvl="1"/>
+            <a:r>
+              <a:rPr lang="en-US" dirty="0"/>
+              <a:t>One exception: NHL player deaths in 2011</a:t>
+            </a:r>
+          </a:p>
+          <a:p>
+            <a:r>
+              <a:rPr lang="en-US" dirty="0"/>
+              <a:t>However, for Major League Baseball players, the A/B test revealed a difference between their age distribution and that of the general population</a:t>
+            </a:r>
+          </a:p>
+        </p:txBody>
+      </p:sp>
+    </p:spTree>
+    <p:extLst>
+      <p:ext uri="{BB962C8B-B14F-4D97-AF65-F5344CB8AC3E}">
+        <p14:creationId xmlns:p14="http://schemas.microsoft.com/office/powerpoint/2010/main" val="3808565248"/>
+      </p:ext>
+    </p:extLst>
+  </p:cSld>
+  <p:clrMapOvr>
+    <a:masterClrMapping/>
+  </p:clrMapOvr>
+</p:sld>
+</file>
+
+<file path=ppt/slides/slide12.xml><?xml version="1.0" encoding="utf-8"?>
+<p:sld xmlns:a="http://schemas.openxmlformats.org/drawingml/2006/main" xmlns:r="http://schemas.openxmlformats.org/officeDocument/2006/relationships" xmlns:p="http://schemas.openxmlformats.org/presentationml/2006/main">
+  <p:cSld>
+    <p:spTree>
+      <p:nvGrpSpPr>
+        <p:cNvPr id="1" name=""/>
+        <p:cNvGrpSpPr/>
+        <p:nvPr/>
+      </p:nvGrpSpPr>
+      <p:grpSpPr>
+        <a:xfrm>
+          <a:off x="0" y="0"/>
+          <a:ext cx="0" cy="0"/>
+          <a:chOff x="0" y="0"/>
+          <a:chExt cx="0" cy="0"/>
+        </a:xfrm>
+      </p:grpSpPr>
+      <p:sp>
+        <p:nvSpPr>
+          <p:cNvPr id="2" name="Title 1">
+            <a:extLst>
+              <a:ext uri="{FF2B5EF4-FFF2-40B4-BE49-F238E27FC236}">
+                <a16:creationId xmlns:a16="http://schemas.microsoft.com/office/drawing/2014/main" id="{A793354D-2898-42B4-8898-3AFE8A760F77}"/>
+              </a:ext>
+            </a:extLst>
+          </p:cNvPr>
+          <p:cNvSpPr>
+            <a:spLocks noGrp="1"/>
+          </p:cNvSpPr>
+          <p:nvPr>
+            <p:ph type="title"/>
+          </p:nvPr>
+        </p:nvSpPr>
+        <p:spPr/>
+        <p:txBody>
+          <a:bodyPr/>
+          <a:lstStyle/>
+          <a:p>
+            <a:r>
+              <a:rPr lang="en-US" dirty="0"/>
+              <a:t>Average Age at Death of Pro Athletes</a:t>
+            </a:r>
+          </a:p>
+        </p:txBody>
+      </p:sp>
+      <p:pic>
+        <p:nvPicPr>
+          <p:cNvPr id="5" name="Content Placeholder 4">
+            <a:extLst>
+              <a:ext uri="{FF2B5EF4-FFF2-40B4-BE49-F238E27FC236}">
+                <a16:creationId xmlns:a16="http://schemas.microsoft.com/office/drawing/2014/main" id="{3BCD4A6F-9DDF-45A2-ABF3-4EEE8E64D786}"/>
+              </a:ext>
+            </a:extLst>
+          </p:cNvPr>
+          <p:cNvPicPr>
+            <a:picLocks noGrp="1" noChangeAspect="1"/>
+          </p:cNvPicPr>
+          <p:nvPr>
+            <p:ph idx="1"/>
+          </p:nvPr>
+        </p:nvPicPr>
+        <p:blipFill>
+          <a:blip r:embed="rId2"/>
+          <a:stretch>
+            <a:fillRect/>
+          </a:stretch>
+        </p:blipFill>
+        <p:spPr>
+          <a:xfrm>
+            <a:off x="1148676" y="1636859"/>
+            <a:ext cx="8125326" cy="4307536"/>
+          </a:xfrm>
+          <a:noFill/>
+        </p:spPr>
+      </p:pic>
+      <p:sp>
+        <p:nvSpPr>
+          <p:cNvPr id="6" name="TextBox 5">
+            <a:extLst>
+              <a:ext uri="{FF2B5EF4-FFF2-40B4-BE49-F238E27FC236}">
+                <a16:creationId xmlns:a16="http://schemas.microsoft.com/office/drawing/2014/main" id="{C6F55E1A-2299-46B4-9442-8567F94D56F6}"/>
+              </a:ext>
+            </a:extLst>
+          </p:cNvPr>
+          <p:cNvSpPr txBox="1"/>
+          <p:nvPr/>
+        </p:nvSpPr>
+        <p:spPr>
+          <a:xfrm>
+            <a:off x="5714229" y="4498590"/>
+            <a:ext cx="2781595" cy="646331"/>
+          </a:xfrm>
+          <a:prstGeom prst="rect">
+            <a:avLst/>
+          </a:prstGeom>
+          <a:noFill/>
+          <a:ln>
+            <a:noFill/>
+          </a:ln>
+        </p:spPr>
+        <p:txBody>
+          <a:bodyPr wrap="none" rtlCol="0">
+            <a:spAutoFit/>
+          </a:bodyPr>
+          <a:lstStyle/>
+          <a:p>
+            <a:r>
+              <a:rPr lang="en-US" dirty="0"/>
+              <a:t>2011 Lokomotiv Yaroslavl</a:t>
+            </a:r>
+          </a:p>
+          <a:p>
+            <a:r>
+              <a:rPr lang="en-US" dirty="0"/>
+              <a:t>Plane crash</a:t>
+            </a:r>
+          </a:p>
+        </p:txBody>
+      </p:sp>
+      <p:sp>
+        <p:nvSpPr>
+          <p:cNvPr id="7" name="Speech Bubble: Rectangle 6">
+            <a:extLst>
+              <a:ext uri="{FF2B5EF4-FFF2-40B4-BE49-F238E27FC236}">
+                <a16:creationId xmlns:a16="http://schemas.microsoft.com/office/drawing/2014/main" id="{6CBCE9E6-D127-44C8-B777-D5E546F4AA0C}"/>
+              </a:ext>
+            </a:extLst>
+          </p:cNvPr>
+          <p:cNvSpPr/>
+          <p:nvPr/>
+        </p:nvSpPr>
+        <p:spPr>
+          <a:xfrm>
+            <a:off x="5495121" y="4422371"/>
+            <a:ext cx="3219813" cy="798770"/>
+          </a:xfrm>
+          <a:prstGeom prst="wedgeRectCallout">
+            <a:avLst>
+              <a:gd name="adj1" fmla="val -22836"/>
+              <a:gd name="adj2" fmla="val -147715"/>
+            </a:avLst>
+          </a:prstGeom>
+          <a:noFill/>
+        </p:spPr>
+        <p:style>
+          <a:lnRef idx="2">
+            <a:schemeClr val="accent1">
+              <a:shade val="50000"/>
+            </a:schemeClr>
+          </a:lnRef>
+          <a:fillRef idx="1">
+            <a:schemeClr val="accent1"/>
+          </a:fillRef>
+          <a:effectRef idx="0">
+            <a:schemeClr val="accent1"/>
+          </a:effectRef>
+          <a:fontRef idx="minor">
+            <a:schemeClr val="lt1"/>
+          </a:fontRef>
+        </p:style>
+        <p:txBody>
+          <a:bodyPr rtlCol="0" anchor="ctr"/>
+          <a:lstStyle/>
+          <a:p>
+            <a:pPr algn="ctr"/>
+            <a:endParaRPr lang="en-US"/>
+          </a:p>
+        </p:txBody>
+      </p:sp>
+    </p:spTree>
+    <p:extLst>
+      <p:ext uri="{BB962C8B-B14F-4D97-AF65-F5344CB8AC3E}">
+        <p14:creationId xmlns:p14="http://schemas.microsoft.com/office/powerpoint/2010/main" val="2204171689"/>
+      </p:ext>
+    </p:extLst>
+  </p:cSld>
+  <p:clrMapOvr>
+    <a:masterClrMapping/>
+  </p:clrMapOvr>
+</p:sld>
+</file>
+
+<file path=ppt/slides/slide13.xml><?xml version="1.0" encoding="utf-8"?>
+<p:sld xmlns:a="http://schemas.openxmlformats.org/drawingml/2006/main" xmlns:r="http://schemas.openxmlformats.org/officeDocument/2006/relationships" xmlns:p="http://schemas.openxmlformats.org/presentationml/2006/main">
+  <p:cSld>
+    <p:spTree>
+      <p:nvGrpSpPr>
+        <p:cNvPr id="1" name=""/>
+        <p:cNvGrpSpPr/>
+        <p:nvPr/>
+      </p:nvGrpSpPr>
+      <p:grpSpPr>
+        <a:xfrm>
+          <a:off x="0" y="0"/>
+          <a:ext cx="0" cy="0"/>
+          <a:chOff x="0" y="0"/>
+          <a:chExt cx="0" cy="0"/>
+        </a:xfrm>
+      </p:grpSpPr>
+      <p:sp>
+        <p:nvSpPr>
+          <p:cNvPr id="2" name="Title 1">
+            <a:extLst>
+              <a:ext uri="{FF2B5EF4-FFF2-40B4-BE49-F238E27FC236}">
+                <a16:creationId xmlns:a16="http://schemas.microsoft.com/office/drawing/2014/main" id="{ED218587-5A19-4BE8-9A95-7DACAAC399E5}"/>
+              </a:ext>
+            </a:extLst>
+          </p:cNvPr>
+          <p:cNvSpPr>
+            <a:spLocks noGrp="1"/>
+          </p:cNvSpPr>
+          <p:nvPr>
+            <p:ph type="title"/>
+          </p:nvPr>
+        </p:nvSpPr>
+        <p:spPr/>
+        <p:txBody>
+          <a:bodyPr/>
+          <a:lstStyle/>
+          <a:p>
+            <a:r>
+              <a:rPr lang="en-US" dirty="0"/>
+              <a:t>Attempt at Classification</a:t>
+            </a:r>
+          </a:p>
+        </p:txBody>
+      </p:sp>
+      <p:sp>
+        <p:nvSpPr>
+          <p:cNvPr id="3" name="Content Placeholder 2">
+            <a:extLst>
+              <a:ext uri="{FF2B5EF4-FFF2-40B4-BE49-F238E27FC236}">
+                <a16:creationId xmlns:a16="http://schemas.microsoft.com/office/drawing/2014/main" id="{63184533-332C-492F-847F-372759A4BF55}"/>
+              </a:ext>
+            </a:extLst>
+          </p:cNvPr>
+          <p:cNvSpPr>
+            <a:spLocks noGrp="1"/>
+          </p:cNvSpPr>
+          <p:nvPr>
+            <p:ph idx="1"/>
+          </p:nvPr>
+        </p:nvSpPr>
+        <p:spPr/>
+        <p:txBody>
+          <a:bodyPr/>
+          <a:lstStyle/>
+          <a:p>
+            <a:r>
+              <a:rPr lang="en-US" dirty="0"/>
+              <a:t>Of all Major League Baseball players who were born between 1930 and 1945, 42% are deceased</a:t>
+            </a:r>
+          </a:p>
+          <a:p>
+            <a:r>
+              <a:rPr lang="en-US" dirty="0"/>
+              <a:t>Can we build a classification model to predict whether a player is still alive?</a:t>
+            </a:r>
+          </a:p>
+          <a:p>
+            <a:r>
+              <a:rPr lang="en-US" dirty="0"/>
+              <a:t>Based on length of career, numbers of games played, listed height and weight, no classification model achieved over 60% accuracy</a:t>
+            </a:r>
+          </a:p>
+          <a:p>
+            <a:r>
+              <a:rPr lang="en-US" dirty="0"/>
+              <a:t>As it turns out, no correlation between any of those characteristics with whether a player is still alive, or how long a player lived</a:t>
+            </a:r>
+          </a:p>
+          <a:p>
+            <a:pPr lvl="1"/>
+            <a:r>
+              <a:rPr lang="en-US" dirty="0"/>
+              <a:t>At best, a slight (and obvious) correlation exists with the year of birth and how long a player lived</a:t>
+            </a:r>
+          </a:p>
+        </p:txBody>
+      </p:sp>
+    </p:spTree>
+    <p:extLst>
+      <p:ext uri="{BB962C8B-B14F-4D97-AF65-F5344CB8AC3E}">
+        <p14:creationId xmlns:p14="http://schemas.microsoft.com/office/powerpoint/2010/main" val="445106356"/>
+      </p:ext>
+    </p:extLst>
+  </p:cSld>
+  <p:clrMapOvr>
+    <a:masterClrMapping/>
+  </p:clrMapOvr>
+</p:sld>
+</file>
+
+<file path=ppt/slides/slide14.xml><?xml version="1.0" encoding="utf-8"?>
+<p:sld xmlns:a="http://schemas.openxmlformats.org/drawingml/2006/main" xmlns:r="http://schemas.openxmlformats.org/officeDocument/2006/relationships" xmlns:p="http://schemas.openxmlformats.org/presentationml/2006/main">
+  <p:cSld>
+    <p:spTree>
+      <p:nvGrpSpPr>
+        <p:cNvPr id="1" name=""/>
+        <p:cNvGrpSpPr/>
+        <p:nvPr/>
+      </p:nvGrpSpPr>
+      <p:grpSpPr>
+        <a:xfrm>
+          <a:off x="0" y="0"/>
+          <a:ext cx="0" cy="0"/>
+          <a:chOff x="0" y="0"/>
+          <a:chExt cx="0" cy="0"/>
+        </a:xfrm>
+      </p:grpSpPr>
+      <p:sp>
+        <p:nvSpPr>
+          <p:cNvPr id="2" name="Title 1">
+            <a:extLst>
+              <a:ext uri="{FF2B5EF4-FFF2-40B4-BE49-F238E27FC236}">
+                <a16:creationId xmlns:a16="http://schemas.microsoft.com/office/drawing/2014/main" id="{0ADFE17C-E7F8-4D43-94F2-FD7F4E6E41FE}"/>
+              </a:ext>
+            </a:extLst>
+          </p:cNvPr>
+          <p:cNvSpPr>
+            <a:spLocks noGrp="1"/>
+          </p:cNvSpPr>
+          <p:nvPr>
+            <p:ph type="title"/>
+          </p:nvPr>
+        </p:nvSpPr>
+        <p:spPr/>
+        <p:txBody>
+          <a:bodyPr/>
+          <a:lstStyle/>
+          <a:p>
+            <a:r>
+              <a:rPr lang="en-US" dirty="0"/>
+              <a:t>Conclusions</a:t>
+            </a:r>
+          </a:p>
+        </p:txBody>
+      </p:sp>
+      <p:sp>
+        <p:nvSpPr>
+          <p:cNvPr id="3" name="Content Placeholder 2">
+            <a:extLst>
+              <a:ext uri="{FF2B5EF4-FFF2-40B4-BE49-F238E27FC236}">
+                <a16:creationId xmlns:a16="http://schemas.microsoft.com/office/drawing/2014/main" id="{80D4028D-82CE-433C-8918-338EB6571B62}"/>
+              </a:ext>
+            </a:extLst>
+          </p:cNvPr>
+          <p:cNvSpPr>
+            <a:spLocks noGrp="1"/>
+          </p:cNvSpPr>
+          <p:nvPr>
+            <p:ph idx="1"/>
+          </p:nvPr>
+        </p:nvSpPr>
+        <p:spPr/>
+        <p:txBody>
+          <a:bodyPr/>
+          <a:lstStyle/>
+          <a:p>
+            <a:r>
+              <a:rPr lang="en-US" dirty="0"/>
+              <a:t>Prediction of number of athlete deaths works reasonably well for NBA players, but consistently overestimates for the other sports (MLB, NFL, NHL).</a:t>
+            </a:r>
+          </a:p>
+          <a:p>
+            <a:r>
+              <a:rPr lang="en-US" dirty="0"/>
+              <a:t>Distribution of ages at death is not significantly different from the general American male population for NFL, NBA, or NHL players</a:t>
+            </a:r>
+          </a:p>
+          <a:p>
+            <a:r>
+              <a:rPr lang="en-US" dirty="0"/>
+              <a:t>However, Major League Baseball players seem to have higher life expectancies than players in other leagues</a:t>
+            </a:r>
+          </a:p>
+          <a:p>
+            <a:r>
+              <a:rPr lang="en-US" dirty="0"/>
+              <a:t>No correlations exist between life expectancy and length of playing career, or even physical dimensions of professional athletes</a:t>
+            </a:r>
+          </a:p>
+        </p:txBody>
+      </p:sp>
+    </p:spTree>
+    <p:extLst>
+      <p:ext uri="{BB962C8B-B14F-4D97-AF65-F5344CB8AC3E}">
+        <p14:creationId xmlns:p14="http://schemas.microsoft.com/office/powerpoint/2010/main" val="1265467141"/>
+      </p:ext>
+    </p:extLst>
+  </p:cSld>
+  <p:clrMapOvr>
+    <a:masterClrMapping/>
+  </p:clrMapOvr>
+</p:sld>
+</file>
+
+<file path=ppt/slides/slide15.xml><?xml version="1.0" encoding="utf-8"?>
+<p:sld xmlns:a="http://schemas.openxmlformats.org/drawingml/2006/main" xmlns:r="http://schemas.openxmlformats.org/officeDocument/2006/relationships" xmlns:p="http://schemas.openxmlformats.org/presentationml/2006/main">
+  <p:cSld>
+    <p:spTree>
+      <p:nvGrpSpPr>
+        <p:cNvPr id="1" name=""/>
+        <p:cNvGrpSpPr/>
+        <p:nvPr/>
+      </p:nvGrpSpPr>
+      <p:grpSpPr>
+        <a:xfrm>
+          <a:off x="0" y="0"/>
+          <a:ext cx="0" cy="0"/>
+          <a:chOff x="0" y="0"/>
+          <a:chExt cx="0" cy="0"/>
+        </a:xfrm>
+      </p:grpSpPr>
+      <p:sp>
+        <p:nvSpPr>
+          <p:cNvPr id="2" name="Title 1">
+            <a:extLst>
+              <a:ext uri="{FF2B5EF4-FFF2-40B4-BE49-F238E27FC236}">
+                <a16:creationId xmlns:a16="http://schemas.microsoft.com/office/drawing/2014/main" id="{9F855106-97DC-4DB0-9B8D-48D61D2AB929}"/>
+              </a:ext>
+            </a:extLst>
+          </p:cNvPr>
+          <p:cNvSpPr>
+            <a:spLocks noGrp="1"/>
+          </p:cNvSpPr>
+          <p:nvPr>
+            <p:ph type="title"/>
+          </p:nvPr>
+        </p:nvSpPr>
+        <p:spPr/>
+        <p:txBody>
+          <a:bodyPr>
+            <a:normAutofit/>
+          </a:bodyPr>
+          <a:lstStyle/>
+          <a:p>
+            <a:r>
+              <a:rPr lang="en-US" sz="3200" dirty="0"/>
+              <a:t>Life expectancy of NFL players is 59 years?</a:t>
+            </a:r>
+          </a:p>
+        </p:txBody>
+      </p:sp>
+      <p:pic>
+        <p:nvPicPr>
+          <p:cNvPr id="3076" name="Picture 4" descr="Image result for mythbusters busted sign">
+            <a:extLst>
+              <a:ext uri="{FF2B5EF4-FFF2-40B4-BE49-F238E27FC236}">
+                <a16:creationId xmlns:a16="http://schemas.microsoft.com/office/drawing/2014/main" id="{28E7A4B7-267B-4E3A-A46B-50DEF7B5804B}"/>
+              </a:ext>
+            </a:extLst>
+          </p:cNvPr>
+          <p:cNvPicPr>
+            <a:picLocks noGrp="1" noChangeAspect="1" noChangeArrowheads="1"/>
+          </p:cNvPicPr>
+          <p:nvPr>
+            <p:ph idx="1"/>
+          </p:nvPr>
+        </p:nvPicPr>
+        <p:blipFill rotWithShape="1">
+          <a:blip r:embed="rId2">
+            <a:extLst>
+              <a:ext uri="{28A0092B-C50C-407E-A947-70E740481C1C}">
+                <a14:useLocalDpi xmlns:a14="http://schemas.microsoft.com/office/drawing/2010/main" val="0"/>
+              </a:ext>
+            </a:extLst>
+          </a:blip>
+          <a:srcRect t="27289" b="27308"/>
+          <a:stretch/>
+        </p:blipFill>
+        <p:spPr bwMode="auto">
+          <a:xfrm>
+            <a:off x="1440873" y="2184513"/>
+            <a:ext cx="6794269" cy="3084819"/>
+          </a:xfrm>
+          <a:prstGeom prst="rect">
+            <a:avLst/>
+          </a:prstGeom>
+          <a:noFill/>
+          <a:extLst>
+            <a:ext uri="{909E8E84-426E-40DD-AFC4-6F175D3DCCD1}">
+              <a14:hiddenFill xmlns:a14="http://schemas.microsoft.com/office/drawing/2010/main">
+                <a:solidFill>
+                  <a:srgbClr val="FFFFFF"/>
+                </a:solidFill>
+              </a14:hiddenFill>
+            </a:ext>
+          </a:extLst>
+        </p:spPr>
+      </p:pic>
+    </p:spTree>
+    <p:extLst>
+      <p:ext uri="{BB962C8B-B14F-4D97-AF65-F5344CB8AC3E}">
+        <p14:creationId xmlns:p14="http://schemas.microsoft.com/office/powerpoint/2010/main" val="4047183876"/>
+      </p:ext>
+    </p:extLst>
+  </p:cSld>
+  <p:clrMapOvr>
+    <a:masterClrMapping/>
+  </p:clrMapOvr>
+</p:sld>
+</file>
+
+<file path=ppt/slides/slide2.xml><?xml version="1.0" encoding="utf-8"?>
+<p:sld xmlns:a="http://schemas.openxmlformats.org/drawingml/2006/main" xmlns:r="http://schemas.openxmlformats.org/officeDocument/2006/relationships" xmlns:p="http://schemas.openxmlformats.org/presentationml/2006/main">
+  <p:cSld>
+    <p:spTree>
+      <p:nvGrpSpPr>
+        <p:cNvPr id="1" name=""/>
+        <p:cNvGrpSpPr/>
+        <p:nvPr/>
+      </p:nvGrpSpPr>
+      <p:grpSpPr>
+        <a:xfrm>
+          <a:off x="0" y="0"/>
+          <a:ext cx="0" cy="0"/>
+          <a:chOff x="0" y="0"/>
+          <a:chExt cx="0" cy="0"/>
+        </a:xfrm>
+      </p:grpSpPr>
+      <p:sp>
+        <p:nvSpPr>
+          <p:cNvPr id="2" name="Title 1">
+            <a:extLst>
+              <a:ext uri="{FF2B5EF4-FFF2-40B4-BE49-F238E27FC236}">
+                <a16:creationId xmlns:a16="http://schemas.microsoft.com/office/drawing/2014/main" id="{B59EB874-36F7-490B-88ED-81E91BA31A99}"/>
+              </a:ext>
+            </a:extLst>
+          </p:cNvPr>
+          <p:cNvSpPr>
+            <a:spLocks noGrp="1"/>
+          </p:cNvSpPr>
+          <p:nvPr>
+            <p:ph type="title"/>
+          </p:nvPr>
+        </p:nvSpPr>
+        <p:spPr/>
+        <p:txBody>
+          <a:bodyPr/>
+          <a:lstStyle/>
+          <a:p>
+            <a:r>
+              <a:rPr lang="en-US" dirty="0"/>
+              <a:t>Problem Statement</a:t>
+            </a:r>
+          </a:p>
+        </p:txBody>
+      </p:sp>
+      <p:sp>
+        <p:nvSpPr>
+          <p:cNvPr id="3" name="Content Placeholder 2">
+            <a:extLst>
+              <a:ext uri="{FF2B5EF4-FFF2-40B4-BE49-F238E27FC236}">
+                <a16:creationId xmlns:a16="http://schemas.microsoft.com/office/drawing/2014/main" id="{9F896558-572F-4C0E-983A-C3C2786F0CBB}"/>
+              </a:ext>
+            </a:extLst>
+          </p:cNvPr>
+          <p:cNvSpPr>
+            <a:spLocks noGrp="1"/>
+          </p:cNvSpPr>
+          <p:nvPr>
+            <p:ph idx="1"/>
+          </p:nvPr>
+        </p:nvSpPr>
+        <p:spPr>
+          <a:xfrm>
+            <a:off x="732753" y="1778204"/>
+            <a:ext cx="8596668" cy="3880773"/>
+          </a:xfrm>
+        </p:spPr>
+        <p:txBody>
+          <a:bodyPr>
+            <a:normAutofit/>
+          </a:bodyPr>
+          <a:lstStyle/>
+          <a:p>
+            <a:pPr marL="0" indent="0">
+              <a:buNone/>
+            </a:pPr>
+            <a:r>
+              <a:rPr lang="en-US" sz="2800" dirty="0">
+                <a:solidFill>
+                  <a:srgbClr val="0070C0"/>
+                </a:solidFill>
+              </a:rPr>
+              <a:t>What impact does a career in professional sports have on the life expectancy of an athlete?</a:t>
+            </a:r>
+          </a:p>
+          <a:p>
+            <a:endParaRPr lang="en-US" dirty="0"/>
+          </a:p>
+          <a:p>
+            <a:r>
+              <a:rPr lang="en-US" dirty="0"/>
+              <a:t>According to Wikipedia article about Football Players:</a:t>
+            </a:r>
+          </a:p>
+          <a:p>
+            <a:pPr lvl="1"/>
+            <a:r>
+              <a:rPr lang="en-US" dirty="0"/>
+              <a:t>The average life expectancy or lifespan of an American football NFL player has been reported to be extremely low, only 53 to 59 years depending on playing position. </a:t>
+            </a:r>
+          </a:p>
+          <a:p>
+            <a:pPr lvl="1"/>
+            <a:r>
+              <a:rPr lang="en-US" dirty="0"/>
+              <a:t>However, a 2012 study reported that retired NFL players have a lower death rate than men in the general population.</a:t>
+            </a:r>
+          </a:p>
+        </p:txBody>
+      </p:sp>
+    </p:spTree>
+    <p:extLst>
+      <p:ext uri="{BB962C8B-B14F-4D97-AF65-F5344CB8AC3E}">
+        <p14:creationId xmlns:p14="http://schemas.microsoft.com/office/powerpoint/2010/main" val="4178919864"/>
+      </p:ext>
+    </p:extLst>
+  </p:cSld>
+  <p:clrMapOvr>
+    <a:masterClrMapping/>
+  </p:clrMapOvr>
+</p:sld>
+</file>
+
+<file path=ppt/slides/slide3.xml><?xml version="1.0" encoding="utf-8"?>
+<p:sld xmlns:a="http://schemas.openxmlformats.org/drawingml/2006/main" xmlns:r="http://schemas.openxmlformats.org/officeDocument/2006/relationships" xmlns:p="http://schemas.openxmlformats.org/presentationml/2006/main">
+  <p:cSld>
+    <p:spTree>
+      <p:nvGrpSpPr>
+        <p:cNvPr id="1" name=""/>
+        <p:cNvGrpSpPr/>
+        <p:nvPr/>
+      </p:nvGrpSpPr>
+      <p:grpSpPr>
+        <a:xfrm>
+          <a:off x="0" y="0"/>
+          <a:ext cx="0" cy="0"/>
+          <a:chOff x="0" y="0"/>
+          <a:chExt cx="0" cy="0"/>
+        </a:xfrm>
+      </p:grpSpPr>
+      <p:sp>
+        <p:nvSpPr>
+          <p:cNvPr id="2" name="Title 1">
+            <a:extLst>
+              <a:ext uri="{FF2B5EF4-FFF2-40B4-BE49-F238E27FC236}">
+                <a16:creationId xmlns:a16="http://schemas.microsoft.com/office/drawing/2014/main" id="{194170BF-68C5-41E0-9A9C-61D6DE63CA0C}"/>
+              </a:ext>
+            </a:extLst>
+          </p:cNvPr>
+          <p:cNvSpPr>
+            <a:spLocks noGrp="1"/>
+          </p:cNvSpPr>
+          <p:nvPr>
+            <p:ph type="title"/>
+          </p:nvPr>
+        </p:nvSpPr>
+        <p:spPr/>
+        <p:txBody>
+          <a:bodyPr/>
+          <a:lstStyle/>
+          <a:p>
+            <a:r>
+              <a:rPr lang="en-US" dirty="0"/>
+              <a:t>Some Ways To Answer That Question…</a:t>
+            </a:r>
+          </a:p>
+        </p:txBody>
+      </p:sp>
+      <p:sp>
+        <p:nvSpPr>
+          <p:cNvPr id="3" name="Content Placeholder 2">
+            <a:extLst>
+              <a:ext uri="{FF2B5EF4-FFF2-40B4-BE49-F238E27FC236}">
+                <a16:creationId xmlns:a16="http://schemas.microsoft.com/office/drawing/2014/main" id="{A017BD10-1B2C-4809-B8CF-DF9986A3B6E6}"/>
+              </a:ext>
+            </a:extLst>
+          </p:cNvPr>
+          <p:cNvSpPr>
+            <a:spLocks noGrp="1"/>
+          </p:cNvSpPr>
+          <p:nvPr>
+            <p:ph idx="1"/>
+          </p:nvPr>
+        </p:nvSpPr>
+        <p:spPr/>
+        <p:txBody>
+          <a:bodyPr/>
+          <a:lstStyle/>
+          <a:p>
+            <a:r>
+              <a:rPr lang="en-US" dirty="0"/>
+              <a:t>Can we build a model to predict how many athletes will die in a given year?</a:t>
+            </a:r>
+          </a:p>
+          <a:p>
+            <a:r>
+              <a:rPr lang="en-US" dirty="0"/>
+              <a:t>How does the distribution of ages at death of athletes compare to that of the general population?</a:t>
+            </a:r>
+          </a:p>
+          <a:p>
+            <a:r>
+              <a:rPr lang="en-US" dirty="0"/>
+              <a:t>Of athletes who were born in a certain time period, can we predict whether they are still alive, or how long they lived based on the length of their playing careers or their physical dimensions?</a:t>
+            </a:r>
+          </a:p>
+          <a:p>
+            <a:endParaRPr lang="en-US" dirty="0"/>
+          </a:p>
+        </p:txBody>
+      </p:sp>
+    </p:spTree>
+    <p:extLst>
+      <p:ext uri="{BB962C8B-B14F-4D97-AF65-F5344CB8AC3E}">
+        <p14:creationId xmlns:p14="http://schemas.microsoft.com/office/powerpoint/2010/main" val="3659802861"/>
+      </p:ext>
+    </p:extLst>
+  </p:cSld>
+  <p:clrMapOvr>
+    <a:masterClrMapping/>
+  </p:clrMapOvr>
+</p:sld>
+</file>
+
+<file path=ppt/slides/slide4.xml><?xml version="1.0" encoding="utf-8"?>
+<p:sld xmlns:a="http://schemas.openxmlformats.org/drawingml/2006/main" xmlns:r="http://schemas.openxmlformats.org/officeDocument/2006/relationships" xmlns:p="http://schemas.openxmlformats.org/presentationml/2006/main">
+  <p:cSld>
+    <p:spTree>
+      <p:nvGrpSpPr>
+        <p:cNvPr id="1" name=""/>
+        <p:cNvGrpSpPr/>
+        <p:nvPr/>
+      </p:nvGrpSpPr>
+      <p:grpSpPr>
+        <a:xfrm>
+          <a:off x="0" y="0"/>
+          <a:ext cx="0" cy="0"/>
+          <a:chOff x="0" y="0"/>
+          <a:chExt cx="0" cy="0"/>
+        </a:xfrm>
+      </p:grpSpPr>
+      <p:sp>
+        <p:nvSpPr>
+          <p:cNvPr id="2" name="Title 1">
+            <a:extLst>
+              <a:ext uri="{FF2B5EF4-FFF2-40B4-BE49-F238E27FC236}">
+                <a16:creationId xmlns:a16="http://schemas.microsoft.com/office/drawing/2014/main" id="{DC777E8D-D457-45EF-8569-B2D685B5C83A}"/>
+              </a:ext>
+            </a:extLst>
+          </p:cNvPr>
+          <p:cNvSpPr>
+            <a:spLocks noGrp="1"/>
+          </p:cNvSpPr>
+          <p:nvPr>
+            <p:ph type="title"/>
+          </p:nvPr>
+        </p:nvSpPr>
+        <p:spPr/>
+        <p:txBody>
+          <a:bodyPr/>
+          <a:lstStyle/>
+          <a:p>
+            <a:r>
+              <a:rPr lang="en-US" dirty="0"/>
+              <a:t>Collecting Player Data</a:t>
+            </a:r>
+          </a:p>
+        </p:txBody>
+      </p:sp>
+      <p:sp>
+        <p:nvSpPr>
+          <p:cNvPr id="3" name="Content Placeholder 2">
+            <a:extLst>
+              <a:ext uri="{FF2B5EF4-FFF2-40B4-BE49-F238E27FC236}">
+                <a16:creationId xmlns:a16="http://schemas.microsoft.com/office/drawing/2014/main" id="{1AE762C2-2CF7-4781-9287-1E9A519825D5}"/>
+              </a:ext>
+            </a:extLst>
+          </p:cNvPr>
+          <p:cNvSpPr>
+            <a:spLocks noGrp="1"/>
+          </p:cNvSpPr>
+          <p:nvPr>
+            <p:ph idx="1"/>
+          </p:nvPr>
+        </p:nvSpPr>
+        <p:spPr>
+          <a:xfrm>
+            <a:off x="677334" y="1833621"/>
+            <a:ext cx="8596668" cy="4101666"/>
+          </a:xfrm>
+        </p:spPr>
+        <p:txBody>
+          <a:bodyPr>
+            <a:normAutofit fontScale="92500" lnSpcReduction="20000"/>
+          </a:bodyPr>
+          <a:lstStyle/>
+          <a:p>
+            <a:r>
+              <a:rPr lang="en-US" dirty="0"/>
+              <a:t>Player data was collected from the following sites:</a:t>
+            </a:r>
+          </a:p>
+          <a:p>
+            <a:pPr lvl="1"/>
+            <a:endParaRPr lang="en-US" dirty="0"/>
+          </a:p>
+          <a:p>
+            <a:endParaRPr lang="en-US" dirty="0"/>
+          </a:p>
+          <a:p>
+            <a:endParaRPr lang="en-US" dirty="0"/>
+          </a:p>
+          <a:p>
+            <a:endParaRPr lang="en-US" dirty="0"/>
+          </a:p>
+          <a:p>
+            <a:endParaRPr lang="en-US" dirty="0"/>
+          </a:p>
+          <a:p>
+            <a:endParaRPr lang="en-US" dirty="0"/>
+          </a:p>
+          <a:p>
+            <a:r>
+              <a:rPr lang="en-US" dirty="0"/>
+              <a:t>From each site, data was collected (or inferred) about each player:</a:t>
+            </a:r>
+          </a:p>
+          <a:p>
+            <a:pPr lvl="1"/>
+            <a:r>
+              <a:rPr lang="en-US" dirty="0"/>
+              <a:t>Date of birth and death</a:t>
+            </a:r>
+          </a:p>
+          <a:p>
+            <a:pPr lvl="1"/>
+            <a:r>
+              <a:rPr lang="en-US" dirty="0"/>
+              <a:t>Age at death</a:t>
+            </a:r>
+          </a:p>
+          <a:p>
+            <a:pPr lvl="1"/>
+            <a:r>
+              <a:rPr lang="en-US" dirty="0"/>
+              <a:t>Length of career: number of seasons and games played</a:t>
+            </a:r>
+          </a:p>
+          <a:p>
+            <a:pPr lvl="1"/>
+            <a:r>
+              <a:rPr lang="en-US" dirty="0"/>
+              <a:t>Height and weight (for selected baseball and football players)</a:t>
+            </a:r>
+          </a:p>
+        </p:txBody>
+      </p:sp>
+      <p:pic>
+        <p:nvPicPr>
+          <p:cNvPr id="4" name="Graphic 3">
+            <a:extLst>
+              <a:ext uri="{FF2B5EF4-FFF2-40B4-BE49-F238E27FC236}">
+                <a16:creationId xmlns:a16="http://schemas.microsoft.com/office/drawing/2014/main" id="{9FC9E3E7-9EB0-4EBF-B05F-E33880CCEF03}"/>
+              </a:ext>
+            </a:extLst>
+          </p:cNvPr>
+          <p:cNvPicPr>
+            <a:picLocks noChangeAspect="1"/>
+          </p:cNvPicPr>
+          <p:nvPr/>
+        </p:nvPicPr>
+        <p:blipFill>
+          <a:blip r:embed="rId2">
+            <a:extLst>
+              <a:ext uri="{96DAC541-7B7A-43D3-8B79-37D633B846F1}">
+                <asvg:svgBlip xmlns:asvg="http://schemas.microsoft.com/office/drawing/2016/SVG/main" r:embed="rId3"/>
+              </a:ext>
+            </a:extLst>
+          </a:blip>
+          <a:stretch>
+            <a:fillRect/>
+          </a:stretch>
+        </p:blipFill>
+        <p:spPr>
+          <a:xfrm>
+            <a:off x="976053" y="2356974"/>
+            <a:ext cx="3767743" cy="664895"/>
+          </a:xfrm>
+          <a:prstGeom prst="rect">
+            <a:avLst/>
+          </a:prstGeom>
+        </p:spPr>
+      </p:pic>
+      <p:pic>
+        <p:nvPicPr>
+          <p:cNvPr id="5" name="Graphic 4">
+            <a:extLst>
+              <a:ext uri="{FF2B5EF4-FFF2-40B4-BE49-F238E27FC236}">
+                <a16:creationId xmlns:a16="http://schemas.microsoft.com/office/drawing/2014/main" id="{6D35DB4A-D8F2-41BF-999B-A270B6DFD99D}"/>
+              </a:ext>
+            </a:extLst>
+          </p:cNvPr>
+          <p:cNvPicPr>
+            <a:picLocks noChangeAspect="1"/>
+          </p:cNvPicPr>
+          <p:nvPr/>
+        </p:nvPicPr>
+        <p:blipFill>
+          <a:blip r:embed="rId4">
+            <a:extLst>
+              <a:ext uri="{96DAC541-7B7A-43D3-8B79-37D633B846F1}">
+                <asvg:svgBlip xmlns:asvg="http://schemas.microsoft.com/office/drawing/2016/SVG/main" r:embed="rId5"/>
+              </a:ext>
+            </a:extLst>
+          </a:blip>
+          <a:stretch>
+            <a:fillRect/>
+          </a:stretch>
+        </p:blipFill>
+        <p:spPr>
+          <a:xfrm>
+            <a:off x="5361350" y="2356973"/>
+            <a:ext cx="4875901" cy="664896"/>
+          </a:xfrm>
+          <a:prstGeom prst="rect">
+            <a:avLst/>
+          </a:prstGeom>
+        </p:spPr>
+      </p:pic>
+      <p:pic>
+        <p:nvPicPr>
+          <p:cNvPr id="9" name="Graphic 8">
+            <a:extLst>
+              <a:ext uri="{FF2B5EF4-FFF2-40B4-BE49-F238E27FC236}">
+                <a16:creationId xmlns:a16="http://schemas.microsoft.com/office/drawing/2014/main" id="{172D70BA-D2F9-46C0-A6F8-9D3DC4E2BC2F}"/>
+              </a:ext>
+            </a:extLst>
+          </p:cNvPr>
+          <p:cNvPicPr>
+            <a:picLocks noChangeAspect="1"/>
+          </p:cNvPicPr>
+          <p:nvPr/>
+        </p:nvPicPr>
+        <p:blipFill>
+          <a:blip r:embed="rId6">
+            <a:extLst>
+              <a:ext uri="{96DAC541-7B7A-43D3-8B79-37D633B846F1}">
+                <asvg:svgBlip xmlns:asvg="http://schemas.microsoft.com/office/drawing/2016/SVG/main" r:embed="rId7"/>
+              </a:ext>
+            </a:extLst>
+          </a:blip>
+          <a:stretch>
+            <a:fillRect/>
+          </a:stretch>
+        </p:blipFill>
+        <p:spPr>
+          <a:xfrm>
+            <a:off x="892925" y="3172045"/>
+            <a:ext cx="3551613" cy="687409"/>
+          </a:xfrm>
+          <a:prstGeom prst="rect">
+            <a:avLst/>
+          </a:prstGeom>
+        </p:spPr>
+      </p:pic>
+      <p:pic>
+        <p:nvPicPr>
+          <p:cNvPr id="10" name="Graphic 9">
+            <a:extLst>
+              <a:ext uri="{FF2B5EF4-FFF2-40B4-BE49-F238E27FC236}">
+                <a16:creationId xmlns:a16="http://schemas.microsoft.com/office/drawing/2014/main" id="{5D163F67-D555-4F20-AFFA-58243799A5F6}"/>
+              </a:ext>
+            </a:extLst>
+          </p:cNvPr>
+          <p:cNvPicPr>
+            <a:picLocks noChangeAspect="1"/>
+          </p:cNvPicPr>
+          <p:nvPr/>
+        </p:nvPicPr>
+        <p:blipFill>
+          <a:blip r:embed="rId8">
+            <a:extLst>
+              <a:ext uri="{96DAC541-7B7A-43D3-8B79-37D633B846F1}">
+                <asvg:svgBlip xmlns:asvg="http://schemas.microsoft.com/office/drawing/2016/SVG/main" r:embed="rId9"/>
+              </a:ext>
+            </a:extLst>
+          </a:blip>
+          <a:stretch>
+            <a:fillRect/>
+          </a:stretch>
+        </p:blipFill>
+        <p:spPr>
+          <a:xfrm>
+            <a:off x="5270961" y="3182196"/>
+            <a:ext cx="4621670" cy="693251"/>
+          </a:xfrm>
+          <a:prstGeom prst="rect">
+            <a:avLst/>
+          </a:prstGeom>
+        </p:spPr>
+      </p:pic>
+    </p:spTree>
+    <p:extLst>
+      <p:ext uri="{BB962C8B-B14F-4D97-AF65-F5344CB8AC3E}">
+        <p14:creationId xmlns:p14="http://schemas.microsoft.com/office/powerpoint/2010/main" val="680091926"/>
+      </p:ext>
+    </p:extLst>
+  </p:cSld>
+  <p:clrMapOvr>
+    <a:masterClrMapping/>
+  </p:clrMapOvr>
+</p:sld>
+</file>
+
+<file path=ppt/slides/slide5.xml><?xml version="1.0" encoding="utf-8"?>
+<p:sld xmlns:a="http://schemas.openxmlformats.org/drawingml/2006/main" xmlns:r="http://schemas.openxmlformats.org/officeDocument/2006/relationships" xmlns:p="http://schemas.openxmlformats.org/presentationml/2006/main">
+  <p:cSld>
+    <p:spTree>
+      <p:nvGrpSpPr>
+        <p:cNvPr id="1" name=""/>
+        <p:cNvGrpSpPr/>
+        <p:nvPr/>
+      </p:nvGrpSpPr>
+      <p:grpSpPr>
+        <a:xfrm>
+          <a:off x="0" y="0"/>
+          <a:ext cx="0" cy="0"/>
+          <a:chOff x="0" y="0"/>
+          <a:chExt cx="0" cy="0"/>
+        </a:xfrm>
+      </p:grpSpPr>
+      <p:sp>
+        <p:nvSpPr>
+          <p:cNvPr id="2" name="Title 1">
+            <a:extLst>
+              <a:ext uri="{FF2B5EF4-FFF2-40B4-BE49-F238E27FC236}">
+                <a16:creationId xmlns:a16="http://schemas.microsoft.com/office/drawing/2014/main" id="{9D3A370D-3770-4352-90D7-4B9117B4453D}"/>
+              </a:ext>
+            </a:extLst>
+          </p:cNvPr>
+          <p:cNvSpPr>
+            <a:spLocks noGrp="1"/>
+          </p:cNvSpPr>
+          <p:nvPr>
+            <p:ph type="title"/>
+          </p:nvPr>
+        </p:nvSpPr>
+        <p:spPr/>
+        <p:txBody>
+          <a:bodyPr/>
+          <a:lstStyle/>
+          <a:p>
+            <a:r>
+              <a:rPr lang="en-US" dirty="0"/>
+              <a:t>Vital Statistics of General Population</a:t>
+            </a:r>
+          </a:p>
+        </p:txBody>
+      </p:sp>
+      <p:sp>
+        <p:nvSpPr>
+          <p:cNvPr id="3" name="Content Placeholder 2">
+            <a:extLst>
+              <a:ext uri="{FF2B5EF4-FFF2-40B4-BE49-F238E27FC236}">
+                <a16:creationId xmlns:a16="http://schemas.microsoft.com/office/drawing/2014/main" id="{7670B50C-EF08-4F56-9C53-EAF5896E6283}"/>
+              </a:ext>
+            </a:extLst>
+          </p:cNvPr>
+          <p:cNvSpPr>
+            <a:spLocks noGrp="1"/>
+          </p:cNvSpPr>
+          <p:nvPr>
+            <p:ph idx="1"/>
+          </p:nvPr>
+        </p:nvSpPr>
+        <p:spPr/>
+        <p:txBody>
+          <a:bodyPr/>
+          <a:lstStyle/>
+          <a:p>
+            <a:r>
+              <a:rPr lang="en-US" dirty="0"/>
+              <a:t>Life expectancy tables from 2004 to 2015 were collected from the Social Security Administration</a:t>
+            </a:r>
+          </a:p>
+          <a:p>
+            <a:r>
+              <a:rPr lang="en-US" dirty="0"/>
+              <a:t>Number of annual live births in the United States were taken from the Center of Disease Control and Prevention</a:t>
+            </a:r>
+          </a:p>
+        </p:txBody>
+      </p:sp>
+      <p:pic>
+        <p:nvPicPr>
+          <p:cNvPr id="5" name="Picture 4">
+            <a:extLst>
+              <a:ext uri="{FF2B5EF4-FFF2-40B4-BE49-F238E27FC236}">
+                <a16:creationId xmlns:a16="http://schemas.microsoft.com/office/drawing/2014/main" id="{FE33958F-8854-4FF4-AD5A-408F5C8DA146}"/>
+              </a:ext>
+            </a:extLst>
+          </p:cNvPr>
+          <p:cNvPicPr>
+            <a:picLocks noChangeAspect="1"/>
+          </p:cNvPicPr>
+          <p:nvPr/>
+        </p:nvPicPr>
+        <p:blipFill>
+          <a:blip r:embed="rId2"/>
+          <a:stretch>
+            <a:fillRect/>
+          </a:stretch>
+        </p:blipFill>
+        <p:spPr>
+          <a:xfrm>
+            <a:off x="2141739" y="3900055"/>
+            <a:ext cx="1864995" cy="1864995"/>
+          </a:xfrm>
+          <a:prstGeom prst="rect">
+            <a:avLst/>
+          </a:prstGeom>
+        </p:spPr>
+      </p:pic>
+      <p:pic>
+        <p:nvPicPr>
+          <p:cNvPr id="10" name="Picture 9">
+            <a:extLst>
+              <a:ext uri="{FF2B5EF4-FFF2-40B4-BE49-F238E27FC236}">
+                <a16:creationId xmlns:a16="http://schemas.microsoft.com/office/drawing/2014/main" id="{3FB2FE99-7015-43C6-AB37-5A9103B3840E}"/>
+              </a:ext>
+            </a:extLst>
+          </p:cNvPr>
+          <p:cNvPicPr>
+            <a:picLocks noChangeAspect="1"/>
+          </p:cNvPicPr>
+          <p:nvPr/>
+        </p:nvPicPr>
+        <p:blipFill>
+          <a:blip r:embed="rId3"/>
+          <a:stretch>
+            <a:fillRect/>
+          </a:stretch>
+        </p:blipFill>
+        <p:spPr>
+          <a:xfrm>
+            <a:off x="5593773" y="3827664"/>
+            <a:ext cx="2667000" cy="2009775"/>
+          </a:xfrm>
+          <a:prstGeom prst="rect">
+            <a:avLst/>
+          </a:prstGeom>
+        </p:spPr>
+      </p:pic>
+    </p:spTree>
+    <p:extLst>
+      <p:ext uri="{BB962C8B-B14F-4D97-AF65-F5344CB8AC3E}">
+        <p14:creationId xmlns:p14="http://schemas.microsoft.com/office/powerpoint/2010/main" val="1500587411"/>
+      </p:ext>
+    </p:extLst>
+  </p:cSld>
+  <p:clrMapOvr>
+    <a:masterClrMapping/>
+  </p:clrMapOvr>
+</p:sld>
+</file>
+
+<file path=ppt/slides/slide6.xml><?xml version="1.0" encoding="utf-8"?>
+<p:sld xmlns:a="http://schemas.openxmlformats.org/drawingml/2006/main" xmlns:r="http://schemas.openxmlformats.org/officeDocument/2006/relationships" xmlns:p="http://schemas.openxmlformats.org/presentationml/2006/main">
+  <p:cSld>
+    <p:spTree>
+      <p:nvGrpSpPr>
+        <p:cNvPr id="1" name=""/>
+        <p:cNvGrpSpPr/>
+        <p:nvPr/>
+      </p:nvGrpSpPr>
+      <p:grpSpPr>
+        <a:xfrm>
+          <a:off x="0" y="0"/>
+          <a:ext cx="0" cy="0"/>
+          <a:chOff x="0" y="0"/>
+          <a:chExt cx="0" cy="0"/>
+        </a:xfrm>
+      </p:grpSpPr>
+      <p:sp>
+        <p:nvSpPr>
+          <p:cNvPr id="2" name="Title 1">
+            <a:extLst>
+              <a:ext uri="{FF2B5EF4-FFF2-40B4-BE49-F238E27FC236}">
+                <a16:creationId xmlns:a16="http://schemas.microsoft.com/office/drawing/2014/main" id="{7231B108-1EFF-4503-BD48-AF01051057FA}"/>
+              </a:ext>
+            </a:extLst>
+          </p:cNvPr>
+          <p:cNvSpPr>
+            <a:spLocks noGrp="1"/>
+          </p:cNvSpPr>
+          <p:nvPr>
+            <p:ph type="title"/>
+          </p:nvPr>
+        </p:nvSpPr>
+        <p:spPr/>
+        <p:txBody>
+          <a:bodyPr/>
+          <a:lstStyle/>
+          <a:p>
+            <a:r>
+              <a:rPr lang="en-US" dirty="0"/>
+              <a:t>Annual Number of Births and Deaths of Professional Athletes</a:t>
+            </a:r>
+          </a:p>
+        </p:txBody>
+      </p:sp>
+      <p:pic>
+        <p:nvPicPr>
+          <p:cNvPr id="11" name="Picture 10">
+            <a:extLst>
+              <a:ext uri="{FF2B5EF4-FFF2-40B4-BE49-F238E27FC236}">
+                <a16:creationId xmlns:a16="http://schemas.microsoft.com/office/drawing/2014/main" id="{DAC740C3-AEC2-4716-8599-2775369DB828}"/>
+              </a:ext>
+            </a:extLst>
+          </p:cNvPr>
+          <p:cNvPicPr>
+            <a:picLocks noChangeAspect="1"/>
+          </p:cNvPicPr>
+          <p:nvPr/>
+        </p:nvPicPr>
+        <p:blipFill>
+          <a:blip r:embed="rId2"/>
+          <a:stretch>
+            <a:fillRect/>
+          </a:stretch>
+        </p:blipFill>
+        <p:spPr>
+          <a:xfrm>
+            <a:off x="677334" y="2155538"/>
+            <a:ext cx="4930986" cy="3496975"/>
+          </a:xfrm>
+          <a:prstGeom prst="rect">
+            <a:avLst/>
+          </a:prstGeom>
+        </p:spPr>
+      </p:pic>
+      <p:pic>
+        <p:nvPicPr>
+          <p:cNvPr id="13" name="Picture 12">
+            <a:extLst>
+              <a:ext uri="{FF2B5EF4-FFF2-40B4-BE49-F238E27FC236}">
+                <a16:creationId xmlns:a16="http://schemas.microsoft.com/office/drawing/2014/main" id="{DA14E0FC-9D2A-4D94-AA43-A4F6095E289D}"/>
+              </a:ext>
+            </a:extLst>
+          </p:cNvPr>
+          <p:cNvPicPr>
+            <a:picLocks noChangeAspect="1"/>
+          </p:cNvPicPr>
+          <p:nvPr/>
+        </p:nvPicPr>
+        <p:blipFill>
+          <a:blip r:embed="rId3"/>
+          <a:stretch>
+            <a:fillRect/>
+          </a:stretch>
+        </p:blipFill>
+        <p:spPr>
+          <a:xfrm>
+            <a:off x="5872392" y="2155538"/>
+            <a:ext cx="4930986" cy="3496975"/>
+          </a:xfrm>
+          <a:prstGeom prst="rect">
+            <a:avLst/>
+          </a:prstGeom>
+        </p:spPr>
+      </p:pic>
+      <p:sp>
+        <p:nvSpPr>
+          <p:cNvPr id="14" name="Speech Bubble: Rectangle 13">
+            <a:extLst>
+              <a:ext uri="{FF2B5EF4-FFF2-40B4-BE49-F238E27FC236}">
+                <a16:creationId xmlns:a16="http://schemas.microsoft.com/office/drawing/2014/main" id="{472AE56A-9E37-4A07-84D3-8DBEB4C41DDB}"/>
+              </a:ext>
+            </a:extLst>
+          </p:cNvPr>
+          <p:cNvSpPr/>
+          <p:nvPr/>
+        </p:nvSpPr>
+        <p:spPr>
+          <a:xfrm>
+            <a:off x="6616931" y="2804160"/>
+            <a:ext cx="1616340" cy="624840"/>
+          </a:xfrm>
+          <a:prstGeom prst="wedgeRectCallout">
+            <a:avLst>
+              <a:gd name="adj1" fmla="val 76098"/>
+              <a:gd name="adj2" fmla="val -49251"/>
+            </a:avLst>
+          </a:prstGeom>
+          <a:noFill/>
+        </p:spPr>
+        <p:style>
+          <a:lnRef idx="2">
+            <a:schemeClr val="accent1">
+              <a:shade val="50000"/>
+            </a:schemeClr>
+          </a:lnRef>
+          <a:fillRef idx="1">
+            <a:schemeClr val="accent1"/>
+          </a:fillRef>
+          <a:effectRef idx="0">
+            <a:schemeClr val="accent1"/>
+          </a:effectRef>
+          <a:fontRef idx="minor">
+            <a:schemeClr val="lt1"/>
+          </a:fontRef>
+        </p:style>
+        <p:txBody>
+          <a:bodyPr rtlCol="0" anchor="ctr"/>
+          <a:lstStyle/>
+          <a:p>
+            <a:pPr algn="ctr"/>
+            <a:endParaRPr lang="en-US"/>
+          </a:p>
+        </p:txBody>
+      </p:sp>
+      <p:sp>
+        <p:nvSpPr>
+          <p:cNvPr id="15" name="TextBox 14">
+            <a:extLst>
+              <a:ext uri="{FF2B5EF4-FFF2-40B4-BE49-F238E27FC236}">
+                <a16:creationId xmlns:a16="http://schemas.microsoft.com/office/drawing/2014/main" id="{E6E49AE6-B797-414D-890D-5984AC6FFDE4}"/>
+              </a:ext>
+            </a:extLst>
+          </p:cNvPr>
+          <p:cNvSpPr txBox="1"/>
+          <p:nvPr/>
+        </p:nvSpPr>
+        <p:spPr>
+          <a:xfrm>
+            <a:off x="6616931" y="2885747"/>
+            <a:ext cx="1616340" cy="461665"/>
+          </a:xfrm>
+          <a:prstGeom prst="rect">
+            <a:avLst/>
+          </a:prstGeom>
+          <a:noFill/>
+        </p:spPr>
+        <p:txBody>
+          <a:bodyPr wrap="none" rtlCol="0">
+            <a:spAutoFit/>
+          </a:bodyPr>
+          <a:lstStyle/>
+          <a:p>
+            <a:r>
+              <a:rPr lang="en-US" sz="1200" dirty="0"/>
+              <a:t>Replacement Players</a:t>
+            </a:r>
+          </a:p>
+          <a:p>
+            <a:r>
+              <a:rPr lang="en-US" sz="1200" dirty="0"/>
+              <a:t>During 1987 strike</a:t>
+            </a:r>
+          </a:p>
+        </p:txBody>
+      </p:sp>
+    </p:spTree>
+    <p:extLst>
+      <p:ext uri="{BB962C8B-B14F-4D97-AF65-F5344CB8AC3E}">
+        <p14:creationId xmlns:p14="http://schemas.microsoft.com/office/powerpoint/2010/main" val="361064940"/>
+      </p:ext>
+    </p:extLst>
+  </p:cSld>
+  <p:clrMapOvr>
+    <a:masterClrMapping/>
+  </p:clrMapOvr>
+</p:sld>
+</file>
+
+<file path=ppt/slides/slide7.xml><?xml version="1.0" encoding="utf-8"?>
+<p:sld xmlns:a="http://schemas.openxmlformats.org/drawingml/2006/main" xmlns:r="http://schemas.openxmlformats.org/officeDocument/2006/relationships" xmlns:p="http://schemas.openxmlformats.org/presentationml/2006/main">
+  <p:cSld>
+    <p:spTree>
+      <p:nvGrpSpPr>
+        <p:cNvPr id="1" name=""/>
+        <p:cNvGrpSpPr/>
+        <p:nvPr/>
+      </p:nvGrpSpPr>
+      <p:grpSpPr>
+        <a:xfrm>
+          <a:off x="0" y="0"/>
+          <a:ext cx="0" cy="0"/>
+          <a:chOff x="0" y="0"/>
+          <a:chExt cx="0" cy="0"/>
+        </a:xfrm>
+      </p:grpSpPr>
+      <p:sp>
+        <p:nvSpPr>
+          <p:cNvPr id="2" name="Title 1">
+            <a:extLst>
+              <a:ext uri="{FF2B5EF4-FFF2-40B4-BE49-F238E27FC236}">
+                <a16:creationId xmlns:a16="http://schemas.microsoft.com/office/drawing/2014/main" id="{1457026B-0792-44C8-91B0-D675F3CF4603}"/>
+              </a:ext>
+            </a:extLst>
+          </p:cNvPr>
+          <p:cNvSpPr>
+            <a:spLocks noGrp="1"/>
+          </p:cNvSpPr>
+          <p:nvPr>
+            <p:ph type="title"/>
+          </p:nvPr>
+        </p:nvSpPr>
+        <p:spPr/>
+        <p:txBody>
+          <a:bodyPr/>
+          <a:lstStyle/>
+          <a:p>
+            <a:r>
+              <a:rPr lang="en-US" dirty="0"/>
+              <a:t>Annual Number of Births and Deaths of Professional Athletes</a:t>
+            </a:r>
+          </a:p>
+        </p:txBody>
+      </p:sp>
+      <p:pic>
+        <p:nvPicPr>
+          <p:cNvPr id="3" name="Picture 2">
+            <a:extLst>
+              <a:ext uri="{FF2B5EF4-FFF2-40B4-BE49-F238E27FC236}">
+                <a16:creationId xmlns:a16="http://schemas.microsoft.com/office/drawing/2014/main" id="{38C9E4E8-121E-4008-9782-563BCD5B6255}"/>
+              </a:ext>
+            </a:extLst>
+          </p:cNvPr>
+          <p:cNvPicPr>
+            <a:picLocks noChangeAspect="1"/>
+          </p:cNvPicPr>
+          <p:nvPr/>
+        </p:nvPicPr>
+        <p:blipFill>
+          <a:blip r:embed="rId2"/>
+          <a:stretch>
+            <a:fillRect/>
+          </a:stretch>
+        </p:blipFill>
+        <p:spPr>
+          <a:xfrm>
+            <a:off x="677335" y="2419375"/>
+            <a:ext cx="4731480" cy="3407646"/>
+          </a:xfrm>
+          <a:prstGeom prst="rect">
+            <a:avLst/>
+          </a:prstGeom>
+        </p:spPr>
+      </p:pic>
+      <p:pic>
+        <p:nvPicPr>
+          <p:cNvPr id="5" name="Picture 4">
+            <a:extLst>
+              <a:ext uri="{FF2B5EF4-FFF2-40B4-BE49-F238E27FC236}">
+                <a16:creationId xmlns:a16="http://schemas.microsoft.com/office/drawing/2014/main" id="{9F11C9F0-1D58-4619-A007-71D45A587E12}"/>
+              </a:ext>
+            </a:extLst>
+          </p:cNvPr>
+          <p:cNvPicPr>
+            <a:picLocks noChangeAspect="1"/>
+          </p:cNvPicPr>
+          <p:nvPr/>
+        </p:nvPicPr>
+        <p:blipFill>
+          <a:blip r:embed="rId3"/>
+          <a:stretch>
+            <a:fillRect/>
+          </a:stretch>
+        </p:blipFill>
+        <p:spPr>
+          <a:xfrm>
+            <a:off x="5780785" y="2419710"/>
+            <a:ext cx="4953717" cy="3513095"/>
+          </a:xfrm>
+          <a:prstGeom prst="rect">
+            <a:avLst/>
+          </a:prstGeom>
+        </p:spPr>
+      </p:pic>
+    </p:spTree>
+    <p:extLst>
+      <p:ext uri="{BB962C8B-B14F-4D97-AF65-F5344CB8AC3E}">
+        <p14:creationId xmlns:p14="http://schemas.microsoft.com/office/powerpoint/2010/main" val="2590267788"/>
+      </p:ext>
+    </p:extLst>
+  </p:cSld>
+  <p:clrMapOvr>
+    <a:masterClrMapping/>
+  </p:clrMapOvr>
+</p:sld>
+</file>
+
+<file path=ppt/slides/slide8.xml><?xml version="1.0" encoding="utf-8"?>
+<p:sld xmlns:a="http://schemas.openxmlformats.org/drawingml/2006/main" xmlns:r="http://schemas.openxmlformats.org/officeDocument/2006/relationships" xmlns:p="http://schemas.openxmlformats.org/presentationml/2006/main">
+  <p:cSld>
+    <p:spTree>
+      <p:nvGrpSpPr>
+        <p:cNvPr id="1" name=""/>
+        <p:cNvGrpSpPr/>
+        <p:nvPr/>
+      </p:nvGrpSpPr>
+      <p:grpSpPr>
+        <a:xfrm>
+          <a:off x="0" y="0"/>
+          <a:ext cx="0" cy="0"/>
+          <a:chOff x="0" y="0"/>
+          <a:chExt cx="0" cy="0"/>
+        </a:xfrm>
+      </p:grpSpPr>
+      <p:sp>
+        <p:nvSpPr>
+          <p:cNvPr id="2" name="Title 1">
+            <a:extLst>
+              <a:ext uri="{FF2B5EF4-FFF2-40B4-BE49-F238E27FC236}">
+                <a16:creationId xmlns:a16="http://schemas.microsoft.com/office/drawing/2014/main" id="{32E6D829-5E92-4177-8887-3223DEDD11F5}"/>
+              </a:ext>
+            </a:extLst>
+          </p:cNvPr>
+          <p:cNvSpPr>
+            <a:spLocks noGrp="1"/>
+          </p:cNvSpPr>
+          <p:nvPr>
+            <p:ph type="title"/>
+          </p:nvPr>
+        </p:nvSpPr>
+        <p:spPr/>
+        <p:txBody>
+          <a:bodyPr/>
+          <a:lstStyle/>
+          <a:p>
+            <a:r>
+              <a:rPr lang="en-US" dirty="0"/>
+              <a:t>Modeling Number of Athlete Deaths in a Particular Year</a:t>
+            </a:r>
+          </a:p>
+        </p:txBody>
+      </p:sp>
+      <p:sp>
+        <p:nvSpPr>
+          <p:cNvPr id="3" name="Content Placeholder 2">
+            <a:extLst>
+              <a:ext uri="{FF2B5EF4-FFF2-40B4-BE49-F238E27FC236}">
+                <a16:creationId xmlns:a16="http://schemas.microsoft.com/office/drawing/2014/main" id="{53E33BBD-664B-44BC-923D-5AA937C1E8CA}"/>
+              </a:ext>
+            </a:extLst>
+          </p:cNvPr>
+          <p:cNvSpPr>
+            <a:spLocks noGrp="1"/>
+          </p:cNvSpPr>
+          <p:nvPr>
+            <p:ph idx="1"/>
+          </p:nvPr>
+        </p:nvSpPr>
+        <p:spPr/>
+        <p:txBody>
+          <a:bodyPr/>
+          <a:lstStyle/>
+          <a:p>
+            <a:r>
+              <a:rPr lang="en-US" dirty="0"/>
+              <a:t>Example: how many NBA players will die in 2015?</a:t>
+            </a:r>
+          </a:p>
+          <a:p>
+            <a:r>
+              <a:rPr lang="en-US" dirty="0"/>
+              <a:t>For each year in the 2015 SSA Life Table, estimate percentage of males who were born that year that will die in 2015</a:t>
+            </a:r>
+          </a:p>
+          <a:p>
+            <a:pPr lvl="1"/>
+            <a:r>
+              <a:rPr lang="en-US" dirty="0"/>
+              <a:t>Example: roughly 3.5% of males born in 1930 will die in 2015</a:t>
+            </a:r>
+          </a:p>
+          <a:p>
+            <a:r>
+              <a:rPr lang="en-US" dirty="0"/>
+              <a:t>Multiply that estimated percentage by the number of athletes who were born in that year to get expected number of athletes who will die at that age</a:t>
+            </a:r>
+          </a:p>
+          <a:p>
+            <a:pPr lvl="1"/>
+            <a:r>
+              <a:rPr lang="en-US" dirty="0"/>
+              <a:t>Of the 39 players born in 1930, about 0.035 * 39 = 1.365 will die in 2015</a:t>
+            </a:r>
+          </a:p>
+          <a:p>
+            <a:r>
+              <a:rPr lang="en-US" dirty="0"/>
+              <a:t>Sum up the expected number of deaths for each birth year to get total expected number of athlete deaths in 2015</a:t>
+            </a:r>
+          </a:p>
+          <a:p>
+            <a:pPr lvl="1"/>
+            <a:r>
+              <a:rPr lang="en-US" dirty="0"/>
+              <a:t>For NBA players 2015, expected number is 43.9 deaths. In actuality, 47 players died.</a:t>
+            </a:r>
+          </a:p>
+        </p:txBody>
+      </p:sp>
+    </p:spTree>
+    <p:extLst>
+      <p:ext uri="{BB962C8B-B14F-4D97-AF65-F5344CB8AC3E}">
+        <p14:creationId xmlns:p14="http://schemas.microsoft.com/office/powerpoint/2010/main" val="3318864619"/>
+      </p:ext>
+    </p:extLst>
+  </p:cSld>
+  <p:clrMapOvr>
+    <a:masterClrMapping/>
+  </p:clrMapOvr>
+</p:sld>
+</file>
+
+<file path=ppt/slides/slide9.xml><?xml version="1.0" encoding="utf-8"?>
+<p:sld xmlns:a="http://schemas.openxmlformats.org/drawingml/2006/main" xmlns:r="http://schemas.openxmlformats.org/officeDocument/2006/relationships" xmlns:p="http://schemas.openxmlformats.org/presentationml/2006/main">
+  <p:cSld>
+    <p:spTree>
+      <p:nvGrpSpPr>
+        <p:cNvPr id="1" name=""/>
+        <p:cNvGrpSpPr/>
+        <p:nvPr/>
+      </p:nvGrpSpPr>
+      <p:grpSpPr>
+        <a:xfrm>
+          <a:off x="0" y="0"/>
+          <a:ext cx="0" cy="0"/>
+          <a:chOff x="0" y="0"/>
+          <a:chExt cx="0" cy="0"/>
+        </a:xfrm>
+      </p:grpSpPr>
+      <p:sp>
+        <p:nvSpPr>
+          <p:cNvPr id="2" name="Title 1">
+            <a:extLst>
+              <a:ext uri="{FF2B5EF4-FFF2-40B4-BE49-F238E27FC236}">
+                <a16:creationId xmlns:a16="http://schemas.microsoft.com/office/drawing/2014/main" id="{6B8B5520-EFFA-46D9-89DF-1434C63E1356}"/>
+              </a:ext>
+            </a:extLst>
+          </p:cNvPr>
+          <p:cNvSpPr>
+            <a:spLocks noGrp="1"/>
+          </p:cNvSpPr>
+          <p:nvPr>
+            <p:ph type="title"/>
+          </p:nvPr>
+        </p:nvSpPr>
+        <p:spPr/>
+        <p:txBody>
+          <a:bodyPr/>
+          <a:lstStyle/>
+          <a:p>
+            <a:r>
+              <a:rPr lang="en-US" dirty="0"/>
+              <a:t>Predicted vs. Actual Number of Deaths</a:t>
+            </a:r>
+          </a:p>
+        </p:txBody>
+      </p:sp>
+      <p:pic>
+        <p:nvPicPr>
+          <p:cNvPr id="13" name="Picture 12">
+            <a:extLst>
+              <a:ext uri="{FF2B5EF4-FFF2-40B4-BE49-F238E27FC236}">
+                <a16:creationId xmlns:a16="http://schemas.microsoft.com/office/drawing/2014/main" id="{5DF2A4E3-9B32-4A8A-8BE4-5694545133C5}"/>
+              </a:ext>
+            </a:extLst>
+          </p:cNvPr>
+          <p:cNvPicPr>
+            <a:picLocks noChangeAspect="1"/>
+          </p:cNvPicPr>
+          <p:nvPr/>
+        </p:nvPicPr>
+        <p:blipFill>
+          <a:blip r:embed="rId2"/>
+          <a:stretch>
+            <a:fillRect/>
+          </a:stretch>
+        </p:blipFill>
+        <p:spPr>
+          <a:xfrm>
+            <a:off x="677334" y="2227811"/>
+            <a:ext cx="4908177" cy="3402676"/>
+          </a:xfrm>
+          <a:prstGeom prst="rect">
+            <a:avLst/>
+          </a:prstGeom>
+        </p:spPr>
+      </p:pic>
+      <p:pic>
+        <p:nvPicPr>
+          <p:cNvPr id="15" name="Picture 14">
+            <a:extLst>
+              <a:ext uri="{FF2B5EF4-FFF2-40B4-BE49-F238E27FC236}">
+                <a16:creationId xmlns:a16="http://schemas.microsoft.com/office/drawing/2014/main" id="{FA968C04-DC24-45A5-96E1-C6618B80D657}"/>
+              </a:ext>
+            </a:extLst>
+          </p:cNvPr>
+          <p:cNvPicPr>
+            <a:picLocks noChangeAspect="1"/>
+          </p:cNvPicPr>
+          <p:nvPr/>
+        </p:nvPicPr>
+        <p:blipFill>
+          <a:blip r:embed="rId3"/>
+          <a:stretch>
+            <a:fillRect/>
+          </a:stretch>
+        </p:blipFill>
+        <p:spPr>
+          <a:xfrm>
+            <a:off x="5643265" y="2227811"/>
+            <a:ext cx="4908177" cy="3402676"/>
+          </a:xfrm>
+          <a:prstGeom prst="rect">
+            <a:avLst/>
+          </a:prstGeom>
+        </p:spPr>
+      </p:pic>
+    </p:spTree>
+    <p:extLst>
+      <p:ext uri="{BB962C8B-B14F-4D97-AF65-F5344CB8AC3E}">
+        <p14:creationId xmlns:p14="http://schemas.microsoft.com/office/powerpoint/2010/main" val="1562408056"/>
+      </p:ext>
+    </p:extLst>
+  </p:cSld>
+  <p:clrMapOvr>
+    <a:masterClrMapping/>
+  </p:clrMapOvr>
+</p:sld>
+</file>
+
 <file path=ppt/theme/theme1.xml><?xml version="1.0" encoding="utf-8"?>
 <a:theme xmlns:a="http://schemas.openxmlformats.org/drawingml/2006/main" name="Facet">
   <a:themeElements>
-    <a:clrScheme name="Facet">
+    <a:clrScheme name="Office">
       <a:dk1>
         <a:sysClr val="windowText" lastClr="000000"/>
       </a:dk1>
@@ -7238,34 +8140,34 @@
         <a:sysClr val="window" lastClr="FFFFFF"/>
       </a:lt1>
       <a:dk2>
-        <a:srgbClr val="2C3C43"/>
+        <a:srgbClr val="44546A"/>
       </a:dk2>
       <a:lt2>
-        <a:srgbClr val="EBEBEB"/>
+        <a:srgbClr val="E7E6E6"/>
       </a:lt2>
       <a:accent1>
-        <a:srgbClr val="90C226"/>
+        <a:srgbClr val="4472C4"/>
       </a:accent1>
       <a:accent2>
-        <a:srgbClr val="54A021"/>
+        <a:srgbClr val="ED7D31"/>
       </a:accent2>
       <a:accent3>
-        <a:srgbClr val="E6B91E"/>
+        <a:srgbClr val="A5A5A5"/>
       </a:accent3>
       <a:accent4>
-        <a:srgbClr val="E76618"/>
+        <a:srgbClr val="FFC000"/>
       </a:accent4>
       <a:accent5>
-        <a:srgbClr val="C42F1A"/>
+        <a:srgbClr val="5B9BD5"/>
       </a:accent5>
       <a:accent6>
-        <a:srgbClr val="918655"/>
+        <a:srgbClr val="70AD47"/>
       </a:accent6>
       <a:hlink>
-        <a:srgbClr val="99CA3C"/>
+        <a:srgbClr val="0563C1"/>
       </a:hlink>
       <a:folHlink>
-        <a:srgbClr val="B9D181"/>
+        <a:srgbClr val="954F72"/>
       </a:folHlink>
     </a:clrScheme>
     <a:fontScheme name="Facet">
@@ -7478,7 +8380,7 @@
   <a:extraClrSchemeLst/>
   <a:extLst>
     <a:ext uri="{05A4C25C-085E-4340-85A3-A5531E510DB2}">
-      <thm15:themeFamily xmlns:thm15="http://schemas.microsoft.com/office/thememl/2012/main" name="Facet" id="{C0C680CD-088A-49FC-A102-D699147F32B2}" vid="{CFBC31BA-B70F-4F30-BCAA-4F3011E16C4D}"/>
+      <thm15:themeFamily xmlns:thm15="http://schemas.microsoft.com/office/thememl/2012/main" name="Facet" id="{C0C680CD-088A-49FC-A102-D699147F32B2}" vid="{0B5AB586-D108-4FC1-8368-649FE654B894}"/>
     </a:ext>
   </a:extLst>
 </a:theme>

</xml_diff>